<commit_message>
Added tracing and evaluation
</commit_message>
<xml_diff>
--- a/extra/advancedRAG-diagram.pptx
+++ b/extra/advancedRAG-diagram.pptx
@@ -6,18 +6,18 @@
     <p:sldMasterId id="2147483648" r:id="rId2"/>
   </p:sldMasterIdLst>
   <p:sldIdLst>
-    <p:sldId id="268" r:id="rId3"/>
-    <p:sldId id="278" r:id="rId4"/>
-    <p:sldId id="277" r:id="rId5"/>
-    <p:sldId id="269" r:id="rId6"/>
-    <p:sldId id="270" r:id="rId7"/>
-    <p:sldId id="271" r:id="rId8"/>
-    <p:sldId id="272" r:id="rId9"/>
-    <p:sldId id="273" r:id="rId10"/>
-    <p:sldId id="261" r:id="rId11"/>
-    <p:sldId id="274" r:id="rId12"/>
-    <p:sldId id="275" r:id="rId13"/>
-    <p:sldId id="276" r:id="rId14"/>
+    <p:sldId id="281" r:id="rId3"/>
+    <p:sldId id="279" r:id="rId4"/>
+    <p:sldId id="278" r:id="rId5"/>
+    <p:sldId id="277" r:id="rId6"/>
+    <p:sldId id="269" r:id="rId7"/>
+    <p:sldId id="270" r:id="rId8"/>
+    <p:sldId id="271" r:id="rId9"/>
+    <p:sldId id="272" r:id="rId10"/>
+    <p:sldId id="273" r:id="rId11"/>
+    <p:sldId id="261" r:id="rId12"/>
+    <p:sldId id="274" r:id="rId13"/>
+    <p:sldId id="275" r:id="rId14"/>
   </p:sldIdLst>
   <p:sldSz cx="12192000" cy="6858000"/>
   <p:notesSz cx="6858000" cy="9144000"/>
@@ -128,12 +128,200 @@
 <p1510:revInfo xmlns:a="http://schemas.openxmlformats.org/drawingml/2006/main" xmlns:r="http://schemas.openxmlformats.org/officeDocument/2006/relationships" xmlns:p1510="http://schemas.microsoft.com/office/powerpoint/2015/10/main">
   <p1510:revLst>
     <p1510:client id="{B0C3879B-8648-4365-9BE0-1F898EB82187}" v="632" dt="2025-04-08T12:37:54.694"/>
+    <p1510:client id="{E7051475-5CC1-4E94-9355-10735E8CB79F}" v="46" dt="2025-04-09T08:07:14.678"/>
   </p1510:revLst>
 </p1510:revInfo>
 </file>
 
 <file path=ppt/changesInfos/changesInfo1.xml><?xml version="1.0" encoding="utf-8"?>
 <pc:chgInfo xmlns:a="http://schemas.openxmlformats.org/drawingml/2006/main" xmlns:r="http://schemas.openxmlformats.org/officeDocument/2006/relationships" xmlns:ac="http://schemas.microsoft.com/office/drawing/2013/main/command" xmlns:pc="http://schemas.microsoft.com/office/powerpoint/2013/main/command">
+  <pc:docChgLst>
+    <pc:chgData name="Niccolo Benetti" userId="35a07fc8-0f49-4c3b-9e45-bcac460e9c1b" providerId="ADAL" clId="{E7051475-5CC1-4E94-9355-10735E8CB79F}"/>
+    <pc:docChg chg="undo custSel addSld delSld modSld sldOrd">
+      <pc:chgData name="Niccolo Benetti" userId="35a07fc8-0f49-4c3b-9e45-bcac460e9c1b" providerId="ADAL" clId="{E7051475-5CC1-4E94-9355-10735E8CB79F}" dt="2025-04-09T08:07:14.678" v="46" actId="47"/>
+      <pc:docMkLst>
+        <pc:docMk/>
+      </pc:docMkLst>
+      <pc:sldChg chg="add del ord">
+        <pc:chgData name="Niccolo Benetti" userId="35a07fc8-0f49-4c3b-9e45-bcac460e9c1b" providerId="ADAL" clId="{E7051475-5CC1-4E94-9355-10735E8CB79F}" dt="2025-04-09T07:43:02.496" v="10" actId="47"/>
+        <pc:sldMkLst>
+          <pc:docMk/>
+          <pc:sldMk cId="861347678" sldId="267"/>
+        </pc:sldMkLst>
+      </pc:sldChg>
+      <pc:sldChg chg="delSp del">
+        <pc:chgData name="Niccolo Benetti" userId="35a07fc8-0f49-4c3b-9e45-bcac460e9c1b" providerId="ADAL" clId="{E7051475-5CC1-4E94-9355-10735E8CB79F}" dt="2025-04-09T07:33:21.361" v="5" actId="47"/>
+        <pc:sldMkLst>
+          <pc:docMk/>
+          <pc:sldMk cId="2918096465" sldId="268"/>
+        </pc:sldMkLst>
+        <pc:spChg chg="del">
+          <ac:chgData name="Niccolo Benetti" userId="35a07fc8-0f49-4c3b-9e45-bcac460e9c1b" providerId="ADAL" clId="{E7051475-5CC1-4E94-9355-10735E8CB79F}" dt="2025-04-09T07:33:15.121" v="1" actId="478"/>
+          <ac:spMkLst>
+            <pc:docMk/>
+            <pc:sldMk cId="2918096465" sldId="268"/>
+            <ac:spMk id="13" creationId="{C1D74CFF-5F63-28C1-C52D-F4213B129022}"/>
+          </ac:spMkLst>
+        </pc:spChg>
+        <pc:spChg chg="del">
+          <ac:chgData name="Niccolo Benetti" userId="35a07fc8-0f49-4c3b-9e45-bcac460e9c1b" providerId="ADAL" clId="{E7051475-5CC1-4E94-9355-10735E8CB79F}" dt="2025-04-09T07:33:15.121" v="1" actId="478"/>
+          <ac:spMkLst>
+            <pc:docMk/>
+            <pc:sldMk cId="2918096465" sldId="268"/>
+            <ac:spMk id="15" creationId="{E23A9A16-2EED-FC41-012A-A2D885D99EFB}"/>
+          </ac:spMkLst>
+        </pc:spChg>
+        <pc:spChg chg="del">
+          <ac:chgData name="Niccolo Benetti" userId="35a07fc8-0f49-4c3b-9e45-bcac460e9c1b" providerId="ADAL" clId="{E7051475-5CC1-4E94-9355-10735E8CB79F}" dt="2025-04-09T07:33:15.121" v="1" actId="478"/>
+          <ac:spMkLst>
+            <pc:docMk/>
+            <pc:sldMk cId="2918096465" sldId="268"/>
+            <ac:spMk id="28" creationId="{8770246B-9A3C-6E01-B81F-55782EE98AB3}"/>
+          </ac:spMkLst>
+        </pc:spChg>
+        <pc:spChg chg="del">
+          <ac:chgData name="Niccolo Benetti" userId="35a07fc8-0f49-4c3b-9e45-bcac460e9c1b" providerId="ADAL" clId="{E7051475-5CC1-4E94-9355-10735E8CB79F}" dt="2025-04-09T07:33:15.121" v="1" actId="478"/>
+          <ac:spMkLst>
+            <pc:docMk/>
+            <pc:sldMk cId="2918096465" sldId="268"/>
+            <ac:spMk id="31" creationId="{E257A346-04C3-FC3E-21CB-4B3678868D47}"/>
+          </ac:spMkLst>
+        </pc:spChg>
+        <pc:spChg chg="del">
+          <ac:chgData name="Niccolo Benetti" userId="35a07fc8-0f49-4c3b-9e45-bcac460e9c1b" providerId="ADAL" clId="{E7051475-5CC1-4E94-9355-10735E8CB79F}" dt="2025-04-09T07:33:15.121" v="1" actId="478"/>
+          <ac:spMkLst>
+            <pc:docMk/>
+            <pc:sldMk cId="2918096465" sldId="268"/>
+            <ac:spMk id="32" creationId="{21CBE70F-ADCA-1960-4F84-4C9599641338}"/>
+          </ac:spMkLst>
+        </pc:spChg>
+        <pc:spChg chg="del">
+          <ac:chgData name="Niccolo Benetti" userId="35a07fc8-0f49-4c3b-9e45-bcac460e9c1b" providerId="ADAL" clId="{E7051475-5CC1-4E94-9355-10735E8CB79F}" dt="2025-04-09T07:33:15.121" v="1" actId="478"/>
+          <ac:spMkLst>
+            <pc:docMk/>
+            <pc:sldMk cId="2918096465" sldId="268"/>
+            <ac:spMk id="37" creationId="{AA6B77B6-9134-4A5E-815D-B6C093DAB3EA}"/>
+          </ac:spMkLst>
+        </pc:spChg>
+        <pc:spChg chg="del">
+          <ac:chgData name="Niccolo Benetti" userId="35a07fc8-0f49-4c3b-9e45-bcac460e9c1b" providerId="ADAL" clId="{E7051475-5CC1-4E94-9355-10735E8CB79F}" dt="2025-04-09T07:33:15.121" v="1" actId="478"/>
+          <ac:spMkLst>
+            <pc:docMk/>
+            <pc:sldMk cId="2918096465" sldId="268"/>
+            <ac:spMk id="38" creationId="{09432D18-A1B5-C1B2-10C3-54720828A869}"/>
+          </ac:spMkLst>
+        </pc:spChg>
+        <pc:spChg chg="del">
+          <ac:chgData name="Niccolo Benetti" userId="35a07fc8-0f49-4c3b-9e45-bcac460e9c1b" providerId="ADAL" clId="{E7051475-5CC1-4E94-9355-10735E8CB79F}" dt="2025-04-09T07:33:15.121" v="1" actId="478"/>
+          <ac:spMkLst>
+            <pc:docMk/>
+            <pc:sldMk cId="2918096465" sldId="268"/>
+            <ac:spMk id="39" creationId="{78258649-B6D0-E61B-E192-A5D749BB8B39}"/>
+          </ac:spMkLst>
+        </pc:spChg>
+        <pc:spChg chg="del">
+          <ac:chgData name="Niccolo Benetti" userId="35a07fc8-0f49-4c3b-9e45-bcac460e9c1b" providerId="ADAL" clId="{E7051475-5CC1-4E94-9355-10735E8CB79F}" dt="2025-04-09T07:33:15.121" v="1" actId="478"/>
+          <ac:spMkLst>
+            <pc:docMk/>
+            <pc:sldMk cId="2918096465" sldId="268"/>
+            <ac:spMk id="40" creationId="{1EF7802B-7DE4-91D6-B86E-6FBF23431057}"/>
+          </ac:spMkLst>
+        </pc:spChg>
+        <pc:spChg chg="del">
+          <ac:chgData name="Niccolo Benetti" userId="35a07fc8-0f49-4c3b-9e45-bcac460e9c1b" providerId="ADAL" clId="{E7051475-5CC1-4E94-9355-10735E8CB79F}" dt="2025-04-09T07:33:15.121" v="1" actId="478"/>
+          <ac:spMkLst>
+            <pc:docMk/>
+            <pc:sldMk cId="2918096465" sldId="268"/>
+            <ac:spMk id="41" creationId="{B80D2CCB-D521-4997-21BA-CF43EB7A8F6E}"/>
+          </ac:spMkLst>
+        </pc:spChg>
+      </pc:sldChg>
+      <pc:sldChg chg="del">
+        <pc:chgData name="Niccolo Benetti" userId="35a07fc8-0f49-4c3b-9e45-bcac460e9c1b" providerId="ADAL" clId="{E7051475-5CC1-4E94-9355-10735E8CB79F}" dt="2025-04-09T08:07:14.678" v="46" actId="47"/>
+        <pc:sldMkLst>
+          <pc:docMk/>
+          <pc:sldMk cId="3632324700" sldId="276"/>
+        </pc:sldMkLst>
+      </pc:sldChg>
+      <pc:sldChg chg="add">
+        <pc:chgData name="Niccolo Benetti" userId="35a07fc8-0f49-4c3b-9e45-bcac460e9c1b" providerId="ADAL" clId="{E7051475-5CC1-4E94-9355-10735E8CB79F}" dt="2025-04-09T07:33:10.789" v="0" actId="2890"/>
+        <pc:sldMkLst>
+          <pc:docMk/>
+          <pc:sldMk cId="786728020" sldId="279"/>
+        </pc:sldMkLst>
+      </pc:sldChg>
+      <pc:sldChg chg="add del">
+        <pc:chgData name="Niccolo Benetti" userId="35a07fc8-0f49-4c3b-9e45-bcac460e9c1b" providerId="ADAL" clId="{E7051475-5CC1-4E94-9355-10735E8CB79F}" dt="2025-04-09T07:42:17.786" v="8" actId="47"/>
+        <pc:sldMkLst>
+          <pc:docMk/>
+          <pc:sldMk cId="1847474594" sldId="280"/>
+        </pc:sldMkLst>
+      </pc:sldChg>
+      <pc:sldChg chg="addSp delSp modSp add mod modClrScheme chgLayout">
+        <pc:chgData name="Niccolo Benetti" userId="35a07fc8-0f49-4c3b-9e45-bcac460e9c1b" providerId="ADAL" clId="{E7051475-5CC1-4E94-9355-10735E8CB79F}" dt="2025-04-09T08:06:19.766" v="45" actId="478"/>
+        <pc:sldMkLst>
+          <pc:docMk/>
+          <pc:sldMk cId="1038571326" sldId="281"/>
+        </pc:sldMkLst>
+        <pc:spChg chg="add del mod">
+          <ac:chgData name="Niccolo Benetti" userId="35a07fc8-0f49-4c3b-9e45-bcac460e9c1b" providerId="ADAL" clId="{E7051475-5CC1-4E94-9355-10735E8CB79F}" dt="2025-04-09T08:06:19.766" v="45" actId="478"/>
+          <ac:spMkLst>
+            <pc:docMk/>
+            <pc:sldMk cId="1038571326" sldId="281"/>
+            <ac:spMk id="12" creationId="{0FB767C1-7E57-CD3C-42A1-80705E408F3E}"/>
+          </ac:spMkLst>
+        </pc:spChg>
+        <pc:picChg chg="add del mod">
+          <ac:chgData name="Niccolo Benetti" userId="35a07fc8-0f49-4c3b-9e45-bcac460e9c1b" providerId="ADAL" clId="{E7051475-5CC1-4E94-9355-10735E8CB79F}" dt="2025-04-09T07:49:31.596" v="17" actId="478"/>
+          <ac:picMkLst>
+            <pc:docMk/>
+            <pc:sldMk cId="1038571326" sldId="281"/>
+            <ac:picMk id="4" creationId="{A5495172-3D41-74E3-D96F-2DEE71983CB5}"/>
+          </ac:picMkLst>
+        </pc:picChg>
+        <pc:picChg chg="add del mod ord">
+          <ac:chgData name="Niccolo Benetti" userId="35a07fc8-0f49-4c3b-9e45-bcac460e9c1b" providerId="ADAL" clId="{E7051475-5CC1-4E94-9355-10735E8CB79F}" dt="2025-04-09T07:57:33.638" v="34" actId="478"/>
+          <ac:picMkLst>
+            <pc:docMk/>
+            <pc:sldMk cId="1038571326" sldId="281"/>
+            <ac:picMk id="6" creationId="{D6FDC0EC-7AB1-B28B-7116-9170882BF38E}"/>
+          </ac:picMkLst>
+        </pc:picChg>
+        <pc:picChg chg="add del mod">
+          <ac:chgData name="Niccolo Benetti" userId="35a07fc8-0f49-4c3b-9e45-bcac460e9c1b" providerId="ADAL" clId="{E7051475-5CC1-4E94-9355-10735E8CB79F}" dt="2025-04-09T07:57:32.925" v="33" actId="478"/>
+          <ac:picMkLst>
+            <pc:docMk/>
+            <pc:sldMk cId="1038571326" sldId="281"/>
+            <ac:picMk id="7" creationId="{69BB8042-F8A4-0281-E6EE-3DCCF54AA3D2}"/>
+          </ac:picMkLst>
+        </pc:picChg>
+        <pc:picChg chg="add del mod">
+          <ac:chgData name="Niccolo Benetti" userId="35a07fc8-0f49-4c3b-9e45-bcac460e9c1b" providerId="ADAL" clId="{E7051475-5CC1-4E94-9355-10735E8CB79F}" dt="2025-04-09T08:05:40.125" v="37" actId="478"/>
+          <ac:picMkLst>
+            <pc:docMk/>
+            <pc:sldMk cId="1038571326" sldId="281"/>
+            <ac:picMk id="9" creationId="{CFFA09EA-CAF3-016B-E0DF-FDDB1F8E7594}"/>
+          </ac:picMkLst>
+        </pc:picChg>
+        <pc:picChg chg="add del mod">
+          <ac:chgData name="Niccolo Benetti" userId="35a07fc8-0f49-4c3b-9e45-bcac460e9c1b" providerId="ADAL" clId="{E7051475-5CC1-4E94-9355-10735E8CB79F}" dt="2025-04-09T08:05:53.308" v="39" actId="478"/>
+          <ac:picMkLst>
+            <pc:docMk/>
+            <pc:sldMk cId="1038571326" sldId="281"/>
+            <ac:picMk id="11" creationId="{5B598697-8050-4367-9092-36EEE342BB1D}"/>
+          </ac:picMkLst>
+        </pc:picChg>
+        <pc:picChg chg="mod">
+          <ac:chgData name="Niccolo Benetti" userId="35a07fc8-0f49-4c3b-9e45-bcac460e9c1b" providerId="ADAL" clId="{E7051475-5CC1-4E94-9355-10735E8CB79F}" dt="2025-04-09T08:06:15.222" v="43" actId="1076"/>
+          <ac:picMkLst>
+            <pc:docMk/>
+            <pc:sldMk cId="1038571326" sldId="281"/>
+            <ac:picMk id="1026" creationId="{E05850B3-BF27-981D-2F0F-E9407FCE3102}"/>
+          </ac:picMkLst>
+        </pc:picChg>
+      </pc:sldChg>
+    </pc:docChg>
+  </pc:docChgLst>
   <pc:docChgLst>
     <pc:chgData name="Niccolo Benetti" userId="35a07fc8-0f49-4c3b-9e45-bcac460e9c1b" providerId="ADAL" clId="{B0C3879B-8648-4365-9BE0-1F898EB82187}"/>
     <pc:docChg chg="undo redo custSel addSld delSld modSld addMainMaster modMainMaster">
@@ -602,22 +790,6 @@
           <pc:docMk/>
           <pc:sldMk cId="1194437484" sldId="272"/>
         </pc:sldMkLst>
-        <pc:spChg chg="add del mod">
-          <ac:chgData name="Niccolo Benetti" userId="35a07fc8-0f49-4c3b-9e45-bcac460e9c1b" providerId="ADAL" clId="{B0C3879B-8648-4365-9BE0-1F898EB82187}" dt="2025-04-07T14:47:27.166" v="744" actId="21"/>
-          <ac:spMkLst>
-            <pc:docMk/>
-            <pc:sldMk cId="1194437484" sldId="272"/>
-            <ac:spMk id="18" creationId="{26254D95-938B-63D8-9B47-7A3F95EE0A24}"/>
-          </ac:spMkLst>
-        </pc:spChg>
-        <pc:spChg chg="add del mod">
-          <ac:chgData name="Niccolo Benetti" userId="35a07fc8-0f49-4c3b-9e45-bcac460e9c1b" providerId="ADAL" clId="{B0C3879B-8648-4365-9BE0-1F898EB82187}" dt="2025-04-07T14:50:06.485" v="815" actId="21"/>
-          <ac:spMkLst>
-            <pc:docMk/>
-            <pc:sldMk cId="1194437484" sldId="272"/>
-            <ac:spMk id="19" creationId="{0626945F-58A0-836D-CB10-7C81170B9CD4}"/>
-          </ac:spMkLst>
-        </pc:spChg>
         <pc:spChg chg="add mod">
           <ac:chgData name="Niccolo Benetti" userId="35a07fc8-0f49-4c3b-9e45-bcac460e9c1b" providerId="ADAL" clId="{B0C3879B-8648-4365-9BE0-1F898EB82187}" dt="2025-04-07T15:57:36.202" v="887" actId="1076"/>
           <ac:spMkLst>
@@ -1339,7 +1511,7 @@
           <a:p>
             <a:fld id="{47C1AC3A-DA0F-4EE1-B97C-9DD4B74036F7}" type="datetimeFigureOut">
               <a:rPr lang="en-US" smtClean="0"/>
-              <a:t>4/7/2025</a:t>
+              <a:t>4/9/2025</a:t>
             </a:fld>
             <a:endParaRPr lang="en-US"/>
           </a:p>
@@ -1393,7 +1565,7 @@
           <a:p>
             <a:fld id="{3969DC7E-7248-4663-8F6E-9957EFE71730}" type="slidenum">
               <a:rPr lang="en-US" smtClean="0"/>
-              <a:t>‹N›</a:t>
+              <a:t>‹#›</a:t>
             </a:fld>
             <a:endParaRPr lang="en-US"/>
           </a:p>
@@ -1539,7 +1711,7 @@
           <a:p>
             <a:fld id="{47C1AC3A-DA0F-4EE1-B97C-9DD4B74036F7}" type="datetimeFigureOut">
               <a:rPr lang="en-US" smtClean="0"/>
-              <a:t>4/7/2025</a:t>
+              <a:t>4/9/2025</a:t>
             </a:fld>
             <a:endParaRPr lang="en-US"/>
           </a:p>
@@ -1593,7 +1765,7 @@
           <a:p>
             <a:fld id="{3969DC7E-7248-4663-8F6E-9957EFE71730}" type="slidenum">
               <a:rPr lang="en-US" smtClean="0"/>
-              <a:t>‹N›</a:t>
+              <a:t>‹#›</a:t>
             </a:fld>
             <a:endParaRPr lang="en-US"/>
           </a:p>
@@ -1749,7 +1921,7 @@
           <a:p>
             <a:fld id="{47C1AC3A-DA0F-4EE1-B97C-9DD4B74036F7}" type="datetimeFigureOut">
               <a:rPr lang="en-US" smtClean="0"/>
-              <a:t>4/7/2025</a:t>
+              <a:t>4/9/2025</a:t>
             </a:fld>
             <a:endParaRPr lang="en-US"/>
           </a:p>
@@ -1803,7 +1975,7 @@
           <a:p>
             <a:fld id="{3969DC7E-7248-4663-8F6E-9957EFE71730}" type="slidenum">
               <a:rPr lang="en-US" smtClean="0"/>
-              <a:t>‹N›</a:t>
+              <a:t>‹#›</a:t>
             </a:fld>
             <a:endParaRPr lang="en-US"/>
           </a:p>
@@ -1862,7 +2034,7 @@
           <a:p>
             <a:fld id="{CC33D5E4-6923-4EF9-B239-5F0C56783A61}" type="datetimeFigureOut">
               <a:rPr lang="en-US" smtClean="0"/>
-              <a:t>4/7/2025</a:t>
+              <a:t>4/9/2025</a:t>
             </a:fld>
             <a:endParaRPr lang="en-US"/>
           </a:p>
@@ -1916,7 +2088,7 @@
           <a:p>
             <a:fld id="{140F95E2-1D6B-47B9-8BAA-B07972D7F77A}" type="slidenum">
               <a:rPr lang="en-US" smtClean="0"/>
-              <a:t>‹N›</a:t>
+              <a:t>‹#›</a:t>
             </a:fld>
             <a:endParaRPr lang="en-US"/>
           </a:p>
@@ -2062,7 +2234,7 @@
           <a:p>
             <a:fld id="{47C1AC3A-DA0F-4EE1-B97C-9DD4B74036F7}" type="datetimeFigureOut">
               <a:rPr lang="en-US" smtClean="0"/>
-              <a:t>4/7/2025</a:t>
+              <a:t>4/9/2025</a:t>
             </a:fld>
             <a:endParaRPr lang="en-US"/>
           </a:p>
@@ -2116,7 +2288,7 @@
           <a:p>
             <a:fld id="{3969DC7E-7248-4663-8F6E-9957EFE71730}" type="slidenum">
               <a:rPr lang="en-US" smtClean="0"/>
-              <a:t>‹N›</a:t>
+              <a:t>‹#›</a:t>
             </a:fld>
             <a:endParaRPr lang="en-US"/>
           </a:p>
@@ -2338,7 +2510,7 @@
           <a:p>
             <a:fld id="{47C1AC3A-DA0F-4EE1-B97C-9DD4B74036F7}" type="datetimeFigureOut">
               <a:rPr lang="en-US" smtClean="0"/>
-              <a:t>4/7/2025</a:t>
+              <a:t>4/9/2025</a:t>
             </a:fld>
             <a:endParaRPr lang="en-US"/>
           </a:p>
@@ -2392,7 +2564,7 @@
           <a:p>
             <a:fld id="{3969DC7E-7248-4663-8F6E-9957EFE71730}" type="slidenum">
               <a:rPr lang="en-US" smtClean="0"/>
-              <a:t>‹N›</a:t>
+              <a:t>‹#›</a:t>
             </a:fld>
             <a:endParaRPr lang="en-US"/>
           </a:p>
@@ -2606,7 +2778,7 @@
           <a:p>
             <a:fld id="{47C1AC3A-DA0F-4EE1-B97C-9DD4B74036F7}" type="datetimeFigureOut">
               <a:rPr lang="en-US" smtClean="0"/>
-              <a:t>4/7/2025</a:t>
+              <a:t>4/9/2025</a:t>
             </a:fld>
             <a:endParaRPr lang="en-US"/>
           </a:p>
@@ -2660,7 +2832,7 @@
           <a:p>
             <a:fld id="{3969DC7E-7248-4663-8F6E-9957EFE71730}" type="slidenum">
               <a:rPr lang="en-US" smtClean="0"/>
-              <a:t>‹N›</a:t>
+              <a:t>‹#›</a:t>
             </a:fld>
             <a:endParaRPr lang="en-US"/>
           </a:p>
@@ -3021,7 +3193,7 @@
           <a:p>
             <a:fld id="{47C1AC3A-DA0F-4EE1-B97C-9DD4B74036F7}" type="datetimeFigureOut">
               <a:rPr lang="en-US" smtClean="0"/>
-              <a:t>4/7/2025</a:t>
+              <a:t>4/9/2025</a:t>
             </a:fld>
             <a:endParaRPr lang="en-US"/>
           </a:p>
@@ -3075,7 +3247,7 @@
           <a:p>
             <a:fld id="{3969DC7E-7248-4663-8F6E-9957EFE71730}" type="slidenum">
               <a:rPr lang="en-US" smtClean="0"/>
-              <a:t>‹N›</a:t>
+              <a:t>‹#›</a:t>
             </a:fld>
             <a:endParaRPr lang="en-US"/>
           </a:p>
@@ -3163,7 +3335,7 @@
           <a:p>
             <a:fld id="{47C1AC3A-DA0F-4EE1-B97C-9DD4B74036F7}" type="datetimeFigureOut">
               <a:rPr lang="en-US" smtClean="0"/>
-              <a:t>4/7/2025</a:t>
+              <a:t>4/9/2025</a:t>
             </a:fld>
             <a:endParaRPr lang="en-US"/>
           </a:p>
@@ -3217,7 +3389,7 @@
           <a:p>
             <a:fld id="{3969DC7E-7248-4663-8F6E-9957EFE71730}" type="slidenum">
               <a:rPr lang="en-US" smtClean="0"/>
-              <a:t>‹N›</a:t>
+              <a:t>‹#›</a:t>
             </a:fld>
             <a:endParaRPr lang="en-US"/>
           </a:p>
@@ -3276,7 +3448,7 @@
           <a:p>
             <a:fld id="{47C1AC3A-DA0F-4EE1-B97C-9DD4B74036F7}" type="datetimeFigureOut">
               <a:rPr lang="en-US" smtClean="0"/>
-              <a:t>4/7/2025</a:t>
+              <a:t>4/9/2025</a:t>
             </a:fld>
             <a:endParaRPr lang="en-US"/>
           </a:p>
@@ -3330,7 +3502,7 @@
           <a:p>
             <a:fld id="{3969DC7E-7248-4663-8F6E-9957EFE71730}" type="slidenum">
               <a:rPr lang="en-US" smtClean="0"/>
-              <a:t>‹N›</a:t>
+              <a:t>‹#›</a:t>
             </a:fld>
             <a:endParaRPr lang="en-US"/>
           </a:p>
@@ -3589,7 +3761,7 @@
           <a:p>
             <a:fld id="{47C1AC3A-DA0F-4EE1-B97C-9DD4B74036F7}" type="datetimeFigureOut">
               <a:rPr lang="en-US" smtClean="0"/>
-              <a:t>4/7/2025</a:t>
+              <a:t>4/9/2025</a:t>
             </a:fld>
             <a:endParaRPr lang="en-US"/>
           </a:p>
@@ -3643,7 +3815,7 @@
           <a:p>
             <a:fld id="{3969DC7E-7248-4663-8F6E-9957EFE71730}" type="slidenum">
               <a:rPr lang="en-US" smtClean="0"/>
-              <a:t>‹N›</a:t>
+              <a:t>‹#›</a:t>
             </a:fld>
             <a:endParaRPr lang="en-US"/>
           </a:p>
@@ -3878,7 +4050,7 @@
           <a:p>
             <a:fld id="{47C1AC3A-DA0F-4EE1-B97C-9DD4B74036F7}" type="datetimeFigureOut">
               <a:rPr lang="en-US" smtClean="0"/>
-              <a:t>4/7/2025</a:t>
+              <a:t>4/9/2025</a:t>
             </a:fld>
             <a:endParaRPr lang="en-US"/>
           </a:p>
@@ -3932,7 +4104,7 @@
           <a:p>
             <a:fld id="{3969DC7E-7248-4663-8F6E-9957EFE71730}" type="slidenum">
               <a:rPr lang="en-US" smtClean="0"/>
-              <a:t>‹N›</a:t>
+              <a:t>‹#›</a:t>
             </a:fld>
             <a:endParaRPr lang="en-US"/>
           </a:p>
@@ -4121,7 +4293,7 @@
           <a:p>
             <a:fld id="{47C1AC3A-DA0F-4EE1-B97C-9DD4B74036F7}" type="datetimeFigureOut">
               <a:rPr lang="en-US" smtClean="0"/>
-              <a:t>4/7/2025</a:t>
+              <a:t>4/9/2025</a:t>
             </a:fld>
             <a:endParaRPr lang="en-US"/>
           </a:p>
@@ -4211,7 +4383,7 @@
           <a:p>
             <a:fld id="{3969DC7E-7248-4663-8F6E-9957EFE71730}" type="slidenum">
               <a:rPr lang="en-US" smtClean="0"/>
-              <a:t>‹N›</a:t>
+              <a:t>‹#›</a:t>
             </a:fld>
             <a:endParaRPr lang="en-US"/>
           </a:p>
@@ -4711,7 +4883,7 @@
           <a:p>
             <a:fld id="{CC33D5E4-6923-4EF9-B239-5F0C56783A61}" type="datetimeFigureOut">
               <a:rPr lang="en-US" smtClean="0"/>
-              <a:t>4/7/2025</a:t>
+              <a:t>4/9/2025</a:t>
             </a:fld>
             <a:endParaRPr lang="en-US"/>
           </a:p>
@@ -4801,7 +4973,7 @@
           <a:p>
             <a:fld id="{140F95E2-1D6B-47B9-8BAA-B07972D7F77A}" type="slidenum">
               <a:rPr lang="en-US" smtClean="0"/>
-              <a:t>‹N›</a:t>
+              <a:t>‹#›</a:t>
             </a:fld>
             <a:endParaRPr lang="en-US"/>
           </a:p>
@@ -5104,6 +5276,152 @@
 <file path=ppt/slides/slide1.xml><?xml version="1.0" encoding="utf-8"?>
 <p:sld xmlns:a="http://schemas.openxmlformats.org/drawingml/2006/main" xmlns:r="http://schemas.openxmlformats.org/officeDocument/2006/relationships" xmlns:p="http://schemas.openxmlformats.org/presentationml/2006/main">
   <p:cSld>
+    <p:spTree>
+      <p:nvGrpSpPr>
+        <p:cNvPr id="1" name=""/>
+        <p:cNvGrpSpPr/>
+        <p:nvPr/>
+      </p:nvGrpSpPr>
+      <p:grpSpPr>
+        <a:xfrm>
+          <a:off x="0" y="0"/>
+          <a:ext cx="0" cy="0"/>
+          <a:chOff x="0" y="0"/>
+          <a:chExt cx="0" cy="0"/>
+        </a:xfrm>
+      </p:grpSpPr>
+      <p:sp>
+        <p:nvSpPr>
+          <p:cNvPr id="2" name="CasellaDiTesto 1">
+            <a:extLst>
+              <a:ext uri="{FF2B5EF4-FFF2-40B4-BE49-F238E27FC236}">
+                <a16:creationId xmlns:a16="http://schemas.microsoft.com/office/drawing/2014/main" id="{0F0AB196-FC4D-F941-6B5A-F124707694DC}"/>
+              </a:ext>
+            </a:extLst>
+          </p:cNvPr>
+          <p:cNvSpPr txBox="1"/>
+          <p:nvPr/>
+        </p:nvSpPr>
+        <p:spPr>
+          <a:xfrm>
+            <a:off x="851338" y="980728"/>
+            <a:ext cx="6036750" cy="5016758"/>
+          </a:xfrm>
+          <a:prstGeom prst="rect">
+            <a:avLst/>
+          </a:prstGeom>
+          <a:noFill/>
+        </p:spPr>
+        <p:txBody>
+          <a:bodyPr wrap="square" rtlCol="0">
+            <a:spAutoFit/>
+          </a:bodyPr>
+          <a:lstStyle/>
+          <a:p>
+            <a:pPr algn="just"/>
+            <a:r>
+              <a:rPr lang="it-IT" sz="8000" b="1" spc="-50">
+                <a:gradFill>
+                  <a:gsLst>
+                    <a:gs pos="21000">
+                      <a:srgbClr val="0078D4"/>
+                    </a:gs>
+                    <a:gs pos="100000">
+                      <a:srgbClr val="C03BC4"/>
+                    </a:gs>
+                  </a:gsLst>
+                  <a:lin ang="2400000" scaled="0"/>
+                </a:gradFill>
+                <a:latin typeface="Segoe UI Semibold" panose="020B0702040204020203" pitchFamily="34" charset="0"/>
+                <a:cs typeface="Segoe UI Semibold" panose="020B0702040204020203" pitchFamily="34" charset="0"/>
+              </a:rPr>
+              <a:t>A</a:t>
+            </a:r>
+            <a:r>
+              <a:rPr lang="en-US" sz="8000" b="1" spc="-50">
+                <a:gradFill>
+                  <a:gsLst>
+                    <a:gs pos="21000">
+                      <a:srgbClr val="0078D4"/>
+                    </a:gs>
+                    <a:gs pos="100000">
+                      <a:srgbClr val="C03BC4"/>
+                    </a:gs>
+                  </a:gsLst>
+                  <a:lin ang="2400000" scaled="0"/>
+                </a:gradFill>
+                <a:latin typeface="Segoe UI Semibold" panose="020B0702040204020203" pitchFamily="34" charset="0"/>
+                <a:cs typeface="Segoe UI Semibold" panose="020B0702040204020203" pitchFamily="34" charset="0"/>
+              </a:rPr>
+              <a:t>DVANCED RAG CON AI FOUNDRY SDK</a:t>
+            </a:r>
+            <a:endParaRPr lang="en-US" sz="8000"/>
+          </a:p>
+        </p:txBody>
+      </p:sp>
+      <p:pic>
+        <p:nvPicPr>
+          <p:cNvPr id="1026" name="Picture 2" descr="Azure AI Studio - Pricing | Microsoft Azure">
+            <a:extLst>
+              <a:ext uri="{FF2B5EF4-FFF2-40B4-BE49-F238E27FC236}">
+                <a16:creationId xmlns:a16="http://schemas.microsoft.com/office/drawing/2014/main" id="{E05850B3-BF27-981D-2F0F-E9407FCE3102}"/>
+              </a:ext>
+            </a:extLst>
+          </p:cNvPr>
+          <p:cNvPicPr>
+            <a:picLocks noChangeAspect="1" noChangeArrowheads="1"/>
+          </p:cNvPicPr>
+          <p:nvPr/>
+        </p:nvPicPr>
+        <p:blipFill>
+          <a:blip r:embed="rId2">
+            <a:extLst>
+              <a:ext uri="{28A0092B-C50C-407E-A947-70E740481C1C}">
+                <a14:useLocalDpi xmlns:a14="http://schemas.microsoft.com/office/drawing/2010/main" val="0"/>
+              </a:ext>
+            </a:extLst>
+          </a:blip>
+          <a:srcRect/>
+          <a:stretch>
+            <a:fillRect/>
+          </a:stretch>
+        </p:blipFill>
+        <p:spPr bwMode="auto">
+          <a:xfrm>
+            <a:off x="5735960" y="1680279"/>
+            <a:ext cx="6661794" cy="3497442"/>
+          </a:xfrm>
+          <a:prstGeom prst="rect">
+            <a:avLst/>
+          </a:prstGeom>
+          <a:noFill/>
+          <a:extLst>
+            <a:ext uri="{909E8E84-426E-40DD-AFC4-6F175D3DCCD1}">
+              <a14:hiddenFill xmlns:a14="http://schemas.microsoft.com/office/drawing/2010/main">
+                <a:solidFill>
+                  <a:srgbClr val="FFFFFF"/>
+                </a:solidFill>
+              </a14:hiddenFill>
+            </a:ext>
+          </a:extLst>
+        </p:spPr>
+      </p:pic>
+    </p:spTree>
+    <p:extLst>
+      <p:ext uri="{BB962C8B-B14F-4D97-AF65-F5344CB8AC3E}">
+        <p14:creationId xmlns:p14="http://schemas.microsoft.com/office/powerpoint/2010/main" val="1038571326"/>
+      </p:ext>
+    </p:extLst>
+  </p:cSld>
+  <p:clrMapOvr>
+    <a:masterClrMapping/>
+  </p:clrMapOvr>
+</p:sld>
+</file>
+
+<file path=ppt/slides/slide10.xml><?xml version="1.0" encoding="utf-8"?>
+<p:sld xmlns:a="http://schemas.openxmlformats.org/drawingml/2006/main" xmlns:r="http://schemas.openxmlformats.org/officeDocument/2006/relationships" xmlns:p="http://schemas.openxmlformats.org/presentationml/2006/main">
+  <p:cSld>
     <p:bg>
       <p:bgPr>
         <a:gradFill>
@@ -5133,7 +5451,7 @@
         <p:cNvPr id="1" name="">
           <a:extLst>
             <a:ext uri="{FF2B5EF4-FFF2-40B4-BE49-F238E27FC236}">
-              <a16:creationId xmlns:a16="http://schemas.microsoft.com/office/drawing/2014/main" id="{84C54CA9-3114-8BFF-D4EF-5ED5F9237F36}"/>
+              <a16:creationId xmlns:a16="http://schemas.microsoft.com/office/drawing/2014/main" id="{6FCB7284-CD00-C82D-8E6B-AD655205B635}"/>
             </a:ext>
           </a:extLst>
         </p:cNvPr>
@@ -5148,167 +5466,63 @@
           <a:chExt cx="0" cy="0"/>
         </a:xfrm>
       </p:grpSpPr>
-      <p:pic>
-        <p:nvPicPr>
-          <p:cNvPr id="1026" name="Picture 2" descr="User Icon Transparent Background">
-            <a:extLst>
-              <a:ext uri="{FF2B5EF4-FFF2-40B4-BE49-F238E27FC236}">
-                <a16:creationId xmlns:a16="http://schemas.microsoft.com/office/drawing/2014/main" id="{9606E8DD-7DB4-1DCF-004D-89755C91C232}"/>
-              </a:ext>
-            </a:extLst>
-          </p:cNvPr>
-          <p:cNvPicPr>
-            <a:picLocks noChangeAspect="1" noChangeArrowheads="1"/>
-          </p:cNvPicPr>
-          <p:nvPr/>
-        </p:nvPicPr>
-        <p:blipFill>
-          <a:blip r:embed="rId2">
-            <a:extLst>
-              <a:ext uri="{BEBA8EAE-BF5A-486C-A8C5-ECC9F3942E4B}">
-                <a14:imgProps xmlns:a14="http://schemas.microsoft.com/office/drawing/2010/main">
-                  <a14:imgLayer r:embed="rId3">
-                    <a14:imgEffect>
-                      <a14:backgroundRemoval t="4509" b="89827" l="9070" r="90000">
-                        <a14:foregroundMark x1="36977" y1="9595" x2="47314" y2="4981"/>
-                        <a14:foregroundMark x1="48706" y1="4740" x2="57907" y2="11098"/>
-                        <a14:foregroundMark x1="57907" y1="11098" x2="57907" y2="11329"/>
-                        <a14:foregroundMark x1="27558" y1="63353" x2="30349" y2="62428"/>
-                        <a14:foregroundMark x1="70698" y1="62890" x2="70698" y2="62890"/>
-                        <a14:foregroundMark x1="9070" y1="82197" x2="9070" y2="82197"/>
-                        <a14:backgroundMark x1="47791" y1="4277" x2="47791" y2="4277"/>
-                        <a14:backgroundMark x1="48140" y1="4740" x2="48140" y2="4740"/>
-                        <a14:backgroundMark x1="47442" y1="4740" x2="49186" y2="4162"/>
-                        <a14:backgroundMark x1="48605" y1="4277" x2="48605" y2="4277"/>
-                      </a14:backgroundRemoval>
-                    </a14:imgEffect>
-                  </a14:imgLayer>
-                </a14:imgProps>
-              </a:ext>
-              <a:ext uri="{28A0092B-C50C-407E-A947-70E740481C1C}">
-                <a14:useLocalDpi xmlns:a14="http://schemas.microsoft.com/office/drawing/2010/main" val="0"/>
-              </a:ext>
-            </a:extLst>
-          </a:blip>
-          <a:srcRect/>
-          <a:stretch>
-            <a:fillRect/>
-          </a:stretch>
-        </p:blipFill>
-        <p:spPr bwMode="auto">
-          <a:xfrm>
-            <a:off x="180684" y="2536494"/>
-            <a:ext cx="1529674" cy="1538577"/>
-          </a:xfrm>
-          <a:prstGeom prst="rect">
-            <a:avLst/>
-          </a:prstGeom>
-          <a:noFill/>
-          <a:extLst>
-            <a:ext uri="{909E8E84-426E-40DD-AFC4-6F175D3DCCD1}">
-              <a14:hiddenFill xmlns:a14="http://schemas.microsoft.com/office/drawing/2010/main">
-                <a:solidFill>
-                  <a:srgbClr val="FFFFFF"/>
-                </a:solidFill>
-              </a14:hiddenFill>
-            </a:ext>
-          </a:extLst>
-        </p:spPr>
-      </p:pic>
-      <p:cxnSp>
-        <p:nvCxnSpPr>
-          <p:cNvPr id="12" name="Connettore 2 11">
-            <a:extLst>
-              <a:ext uri="{FF2B5EF4-FFF2-40B4-BE49-F238E27FC236}">
-                <a16:creationId xmlns:a16="http://schemas.microsoft.com/office/drawing/2014/main" id="{26AF9E99-28D6-5F9A-4A00-B54074BAA0F4}"/>
-              </a:ext>
-            </a:extLst>
-          </p:cNvPr>
-          <p:cNvCxnSpPr>
-            <a:cxnSpLocks/>
-          </p:cNvCxnSpPr>
-          <p:nvPr/>
-        </p:nvCxnSpPr>
-        <p:spPr>
-          <a:xfrm>
-            <a:off x="1549940" y="3297676"/>
-            <a:ext cx="1433209" cy="0"/>
-          </a:xfrm>
-          <a:prstGeom prst="straightConnector1">
-            <a:avLst/>
-          </a:prstGeom>
-          <a:ln>
-            <a:tailEnd type="triangle"/>
-          </a:ln>
+      <p:sp>
+        <p:nvSpPr>
+          <p:cNvPr id="12" name="Rettangolo con angoli arrotondati 11">
+            <a:extLst>
+              <a:ext uri="{FF2B5EF4-FFF2-40B4-BE49-F238E27FC236}">
+                <a16:creationId xmlns:a16="http://schemas.microsoft.com/office/drawing/2014/main" id="{6EAEDE85-67AC-C05A-9D25-6A16982C951E}"/>
+              </a:ext>
+            </a:extLst>
+          </p:cNvPr>
+          <p:cNvSpPr/>
+          <p:nvPr/>
+        </p:nvSpPr>
+        <p:spPr>
+          <a:xfrm>
+            <a:off x="585857" y="3973748"/>
+            <a:ext cx="1753388" cy="826215"/>
+          </a:xfrm>
+          <a:prstGeom prst="roundRect">
+            <a:avLst>
+              <a:gd name="adj" fmla="val 18365"/>
+            </a:avLst>
+          </a:prstGeom>
+          <a:solidFill>
+            <a:schemeClr val="bg2"/>
+          </a:solidFill>
         </p:spPr>
         <p:style>
           <a:lnRef idx="2">
-            <a:schemeClr val="dk1"/>
+            <a:schemeClr val="accent1">
+              <a:shade val="15000"/>
+            </a:schemeClr>
           </a:lnRef>
-          <a:fillRef idx="0">
-            <a:schemeClr val="dk1"/>
+          <a:fillRef idx="1">
+            <a:schemeClr val="accent1"/>
           </a:fillRef>
-          <a:effectRef idx="1">
-            <a:schemeClr val="dk1"/>
+          <a:effectRef idx="0">
+            <a:schemeClr val="accent1"/>
           </a:effectRef>
           <a:fontRef idx="minor">
-            <a:schemeClr val="tx1"/>
+            <a:schemeClr val="lt1"/>
           </a:fontRef>
         </p:style>
-      </p:cxnSp>
-      <p:pic>
-        <p:nvPicPr>
-          <p:cNvPr id="1028" name="Picture 4" descr="Gear Icon Png">
-            <a:extLst>
-              <a:ext uri="{FF2B5EF4-FFF2-40B4-BE49-F238E27FC236}">
-                <a16:creationId xmlns:a16="http://schemas.microsoft.com/office/drawing/2014/main" id="{0AE662AE-43E4-0150-60B3-675BADFAB6BA}"/>
-              </a:ext>
-            </a:extLst>
-          </p:cNvPr>
-          <p:cNvPicPr>
-            <a:picLocks noChangeAspect="1" noChangeArrowheads="1"/>
-          </p:cNvPicPr>
-          <p:nvPr/>
-        </p:nvPicPr>
-        <p:blipFill>
-          <a:blip r:embed="rId4">
-            <a:extLst>
-              <a:ext uri="{28A0092B-C50C-407E-A947-70E740481C1C}">
-                <a14:useLocalDpi xmlns:a14="http://schemas.microsoft.com/office/drawing/2010/main" val="0"/>
-              </a:ext>
-            </a:extLst>
-          </a:blip>
-          <a:srcRect/>
-          <a:stretch>
-            <a:fillRect/>
-          </a:stretch>
-        </p:blipFill>
-        <p:spPr bwMode="auto">
-          <a:xfrm>
-            <a:off x="3124551" y="2601344"/>
-            <a:ext cx="1296773" cy="1154350"/>
-          </a:xfrm>
-          <a:prstGeom prst="rect">
-            <a:avLst/>
-          </a:prstGeom>
-          <a:noFill/>
-          <a:extLst>
-            <a:ext uri="{909E8E84-426E-40DD-AFC4-6F175D3DCCD1}">
-              <a14:hiddenFill xmlns:a14="http://schemas.microsoft.com/office/drawing/2010/main">
-                <a:solidFill>
-                  <a:srgbClr val="FFFFFF"/>
-                </a:solidFill>
-              </a14:hiddenFill>
-            </a:ext>
-          </a:extLst>
-        </p:spPr>
-      </p:pic>
+        <p:txBody>
+          <a:bodyPr rtlCol="0" anchor="ctr"/>
+          <a:lstStyle/>
+          <a:p>
+            <a:pPr algn="ctr"/>
+            <a:endParaRPr lang="en-US"/>
+          </a:p>
+        </p:txBody>
+      </p:sp>
       <p:sp>
         <p:nvSpPr>
           <p:cNvPr id="13" name="CasellaDiTesto 12">
             <a:extLst>
               <a:ext uri="{FF2B5EF4-FFF2-40B4-BE49-F238E27FC236}">
-                <a16:creationId xmlns:a16="http://schemas.microsoft.com/office/drawing/2014/main" id="{C1D74CFF-5F63-28C1-C52D-F4213B129022}"/>
+                <a16:creationId xmlns:a16="http://schemas.microsoft.com/office/drawing/2014/main" id="{CDE5D162-B2D0-4FEF-2387-3C19B7C063FD}"/>
               </a:ext>
             </a:extLst>
           </p:cNvPr>
@@ -5317,8 +5531,8 @@
         </p:nvSpPr>
         <p:spPr>
           <a:xfrm>
-            <a:off x="3670571" y="3407923"/>
-            <a:ext cx="817123" cy="523220"/>
+            <a:off x="851952" y="4096860"/>
+            <a:ext cx="1213191" cy="584775"/>
           </a:xfrm>
           <a:prstGeom prst="rect">
             <a:avLst/>
@@ -5332,82 +5546,72 @@
           <a:lstStyle/>
           <a:p>
             <a:r>
-              <a:rPr lang="it-IT" sz="2800" b="1">
-                <a:solidFill>
-                  <a:schemeClr val="tx1">
-                    <a:lumMod val="75000"/>
-                    <a:lumOff val="25000"/>
-                  </a:schemeClr>
-                </a:solidFill>
-                <a:latin typeface="Consolas" panose="020B0609020204030204" pitchFamily="49" charset="0"/>
-              </a:rPr>
-              <a:t>LLM</a:t>
-            </a:r>
-            <a:endParaRPr lang="en-US" sz="2800" b="1">
-              <a:solidFill>
-                <a:schemeClr val="tx1">
-                  <a:lumMod val="75000"/>
-                  <a:lumOff val="25000"/>
-                </a:schemeClr>
-              </a:solidFill>
+              <a:rPr lang="it-IT" sz="1600" b="1" i="1">
+                <a:latin typeface="Consolas" panose="020B0609020204030204" pitchFamily="49" charset="0"/>
+              </a:rPr>
+              <a:t>Documents retrieved</a:t>
+            </a:r>
+            <a:endParaRPr lang="it-IT" sz="1600">
               <a:latin typeface="Consolas" panose="020B0609020204030204" pitchFamily="49" charset="0"/>
             </a:endParaRPr>
           </a:p>
         </p:txBody>
       </p:sp>
-      <p:pic>
-        <p:nvPicPr>
-          <p:cNvPr id="14" name="Picture 4" descr="Gear Icon Png">
-            <a:extLst>
-              <a:ext uri="{FF2B5EF4-FFF2-40B4-BE49-F238E27FC236}">
-                <a16:creationId xmlns:a16="http://schemas.microsoft.com/office/drawing/2014/main" id="{4D20C758-3CDA-F42B-57F0-15270F4BCDA9}"/>
-              </a:ext>
-            </a:extLst>
-          </p:cNvPr>
-          <p:cNvPicPr>
-            <a:picLocks noChangeAspect="1" noChangeArrowheads="1"/>
-          </p:cNvPicPr>
-          <p:nvPr/>
-        </p:nvPicPr>
-        <p:blipFill>
-          <a:blip r:embed="rId4">
-            <a:extLst>
-              <a:ext uri="{28A0092B-C50C-407E-A947-70E740481C1C}">
-                <a14:useLocalDpi xmlns:a14="http://schemas.microsoft.com/office/drawing/2010/main" val="0"/>
-              </a:ext>
-            </a:extLst>
-          </a:blip>
-          <a:srcRect/>
-          <a:stretch>
-            <a:fillRect/>
-          </a:stretch>
-        </p:blipFill>
-        <p:spPr bwMode="auto">
-          <a:xfrm>
-            <a:off x="8498737" y="2601344"/>
-            <a:ext cx="1296773" cy="1154350"/>
-          </a:xfrm>
-          <a:prstGeom prst="rect">
-            <a:avLst/>
-          </a:prstGeom>
-          <a:noFill/>
-          <a:extLst>
-            <a:ext uri="{909E8E84-426E-40DD-AFC4-6F175D3DCCD1}">
-              <a14:hiddenFill xmlns:a14="http://schemas.microsoft.com/office/drawing/2010/main">
-                <a:solidFill>
-                  <a:srgbClr val="FFFFFF"/>
-                </a:solidFill>
-              </a14:hiddenFill>
-            </a:ext>
-          </a:extLst>
-        </p:spPr>
-      </p:pic>
-      <p:sp>
-        <p:nvSpPr>
-          <p:cNvPr id="15" name="CasellaDiTesto 14">
-            <a:extLst>
-              <a:ext uri="{FF2B5EF4-FFF2-40B4-BE49-F238E27FC236}">
-                <a16:creationId xmlns:a16="http://schemas.microsoft.com/office/drawing/2014/main" id="{E23A9A16-2EED-FC41-012A-A2D885D99EFB}"/>
+      <p:sp>
+        <p:nvSpPr>
+          <p:cNvPr id="2" name="Rettangolo con angoli arrotondati 1">
+            <a:extLst>
+              <a:ext uri="{FF2B5EF4-FFF2-40B4-BE49-F238E27FC236}">
+                <a16:creationId xmlns:a16="http://schemas.microsoft.com/office/drawing/2014/main" id="{540EB26A-9E19-874F-4F1C-00E4273BD670}"/>
+              </a:ext>
+            </a:extLst>
+          </p:cNvPr>
+          <p:cNvSpPr/>
+          <p:nvPr/>
+        </p:nvSpPr>
+        <p:spPr>
+          <a:xfrm>
+            <a:off x="585857" y="1927855"/>
+            <a:ext cx="1745382" cy="960184"/>
+          </a:xfrm>
+          <a:prstGeom prst="roundRect">
+            <a:avLst/>
+          </a:prstGeom>
+          <a:solidFill>
+            <a:schemeClr val="bg2"/>
+          </a:solidFill>
+        </p:spPr>
+        <p:style>
+          <a:lnRef idx="2">
+            <a:schemeClr val="accent1">
+              <a:shade val="15000"/>
+            </a:schemeClr>
+          </a:lnRef>
+          <a:fillRef idx="1">
+            <a:schemeClr val="accent1"/>
+          </a:fillRef>
+          <a:effectRef idx="0">
+            <a:schemeClr val="accent1"/>
+          </a:effectRef>
+          <a:fontRef idx="minor">
+            <a:schemeClr val="lt1"/>
+          </a:fontRef>
+        </p:style>
+        <p:txBody>
+          <a:bodyPr rtlCol="0" anchor="ctr"/>
+          <a:lstStyle/>
+          <a:p>
+            <a:pPr algn="ctr"/>
+            <a:endParaRPr lang="en-US"/>
+          </a:p>
+        </p:txBody>
+      </p:sp>
+      <p:sp>
+        <p:nvSpPr>
+          <p:cNvPr id="8" name="CasellaDiTesto 7">
+            <a:extLst>
+              <a:ext uri="{FF2B5EF4-FFF2-40B4-BE49-F238E27FC236}">
+                <a16:creationId xmlns:a16="http://schemas.microsoft.com/office/drawing/2014/main" id="{04CA574B-D0A5-2998-CC33-2B94F8726A7F}"/>
               </a:ext>
             </a:extLst>
           </p:cNvPr>
@@ -5416,8 +5620,8 @@
         </p:nvSpPr>
         <p:spPr>
           <a:xfrm>
-            <a:off x="9044757" y="3407923"/>
-            <a:ext cx="817123" cy="523220"/>
+            <a:off x="645743" y="1992449"/>
+            <a:ext cx="1693502" cy="830997"/>
           </a:xfrm>
           <a:prstGeom prst="rect">
             <a:avLst/>
@@ -5430,841 +5634,35 @@
           </a:bodyPr>
           <a:lstStyle/>
           <a:p>
-            <a:r>
-              <a:rPr lang="it-IT" sz="2800" b="1">
-                <a:solidFill>
-                  <a:schemeClr val="tx1">
-                    <a:lumMod val="75000"/>
-                    <a:lumOff val="25000"/>
-                  </a:schemeClr>
-                </a:solidFill>
-                <a:latin typeface="Consolas" panose="020B0609020204030204" pitchFamily="49" charset="0"/>
-              </a:rPr>
-              <a:t>LLM</a:t>
-            </a:r>
-            <a:endParaRPr lang="en-US" sz="2800" b="1">
-              <a:solidFill>
-                <a:schemeClr val="tx1">
-                  <a:lumMod val="75000"/>
-                  <a:lumOff val="25000"/>
-                </a:schemeClr>
-              </a:solidFill>
+            <a:pPr algn="ctr"/>
+            <a:r>
+              <a:rPr lang="it-IT" sz="1600" b="1">
+                <a:latin typeface="Consolas" panose="020B0609020204030204" pitchFamily="49" charset="0"/>
+              </a:rPr>
+              <a:t>History</a:t>
+            </a:r>
+            <a:endParaRPr lang="en-US" sz="1600" b="1">
               <a:latin typeface="Consolas" panose="020B0609020204030204" pitchFamily="49" charset="0"/>
             </a:endParaRPr>
           </a:p>
-        </p:txBody>
-      </p:sp>
-      <p:pic>
-        <p:nvPicPr>
-          <p:cNvPr id="16" name="Picture 6" descr="Azure Search : installation et configuration ! | Le blog de Cellenza">
-            <a:extLst>
-              <a:ext uri="{FF2B5EF4-FFF2-40B4-BE49-F238E27FC236}">
-                <a16:creationId xmlns:a16="http://schemas.microsoft.com/office/drawing/2014/main" id="{6ED6CBCC-6749-E8A1-88A4-765939474068}"/>
-              </a:ext>
-            </a:extLst>
-          </p:cNvPr>
-          <p:cNvPicPr>
-            <a:picLocks noChangeAspect="1" noChangeArrowheads="1"/>
-          </p:cNvPicPr>
-          <p:nvPr/>
-        </p:nvPicPr>
-        <p:blipFill>
-          <a:blip r:embed="rId5">
-            <a:extLst>
-              <a:ext uri="{28A0092B-C50C-407E-A947-70E740481C1C}">
-                <a14:useLocalDpi xmlns:a14="http://schemas.microsoft.com/office/drawing/2010/main" val="0"/>
-              </a:ext>
-            </a:extLst>
-          </a:blip>
-          <a:srcRect/>
-          <a:stretch>
-            <a:fillRect/>
-          </a:stretch>
-        </p:blipFill>
-        <p:spPr bwMode="auto">
-          <a:xfrm>
-            <a:off x="5984037" y="2677982"/>
-            <a:ext cx="1077712" cy="1077712"/>
-          </a:xfrm>
-          <a:prstGeom prst="rect">
-            <a:avLst/>
-          </a:prstGeom>
-          <a:noFill/>
-          <a:extLst>
-            <a:ext uri="{909E8E84-426E-40DD-AFC4-6F175D3DCCD1}">
-              <a14:hiddenFill xmlns:a14="http://schemas.microsoft.com/office/drawing/2010/main">
-                <a:solidFill>
-                  <a:srgbClr val="FFFFFF"/>
-                </a:solidFill>
-              </a14:hiddenFill>
-            </a:ext>
-          </a:extLst>
-        </p:spPr>
-      </p:pic>
-      <p:sp>
-        <p:nvSpPr>
-          <p:cNvPr id="17" name="Arco 16">
-            <a:extLst>
-              <a:ext uri="{FF2B5EF4-FFF2-40B4-BE49-F238E27FC236}">
-                <a16:creationId xmlns:a16="http://schemas.microsoft.com/office/drawing/2014/main" id="{76490193-D49E-349A-2F0C-5FAAC3434DAA}"/>
-              </a:ext>
-            </a:extLst>
-          </p:cNvPr>
-          <p:cNvSpPr/>
-          <p:nvPr/>
-        </p:nvSpPr>
-        <p:spPr>
-          <a:xfrm>
-            <a:off x="3550358" y="3975959"/>
-            <a:ext cx="761763" cy="761763"/>
-          </a:xfrm>
-          <a:prstGeom prst="arc">
-            <a:avLst>
-              <a:gd name="adj1" fmla="val 18032190"/>
-              <a:gd name="adj2" fmla="val 14403248"/>
-            </a:avLst>
-          </a:prstGeom>
-          <a:ln>
-            <a:solidFill>
-              <a:schemeClr val="accent2">
-                <a:lumMod val="75000"/>
-              </a:schemeClr>
-            </a:solidFill>
-            <a:headEnd type="none" w="med" len="med"/>
-            <a:tailEnd type="triangle" w="med" len="med"/>
-          </a:ln>
-        </p:spPr>
-        <p:style>
-          <a:lnRef idx="2">
-            <a:schemeClr val="dk1"/>
-          </a:lnRef>
-          <a:fillRef idx="0">
-            <a:schemeClr val="dk1"/>
-          </a:fillRef>
-          <a:effectRef idx="1">
-            <a:schemeClr val="dk1"/>
-          </a:effectRef>
-          <a:fontRef idx="minor">
-            <a:schemeClr val="tx1"/>
-          </a:fontRef>
-        </p:style>
-        <p:txBody>
-          <a:bodyPr rtlCol="0" anchor="ctr"/>
-          <a:lstStyle/>
           <a:p>
             <a:pPr algn="ctr"/>
-            <a:endParaRPr lang="en-US"/>
-          </a:p>
-        </p:txBody>
-      </p:sp>
-      <p:cxnSp>
-        <p:nvCxnSpPr>
-          <p:cNvPr id="18" name="Connettore 2 17">
-            <a:extLst>
-              <a:ext uri="{FF2B5EF4-FFF2-40B4-BE49-F238E27FC236}">
-                <a16:creationId xmlns:a16="http://schemas.microsoft.com/office/drawing/2014/main" id="{CD709C1A-55B1-7689-DBB1-E5321F0B3830}"/>
-              </a:ext>
-            </a:extLst>
-          </p:cNvPr>
-          <p:cNvCxnSpPr>
-            <a:cxnSpLocks/>
-          </p:cNvCxnSpPr>
-          <p:nvPr/>
-        </p:nvCxnSpPr>
-        <p:spPr>
-          <a:xfrm>
-            <a:off x="4511732" y="3289570"/>
-            <a:ext cx="1305412" cy="0"/>
-          </a:xfrm>
-          <a:prstGeom prst="straightConnector1">
-            <a:avLst/>
-          </a:prstGeom>
-          <a:ln>
-            <a:tailEnd type="triangle"/>
-          </a:ln>
-        </p:spPr>
-        <p:style>
-          <a:lnRef idx="2">
-            <a:schemeClr val="dk1"/>
-          </a:lnRef>
-          <a:fillRef idx="0">
-            <a:schemeClr val="dk1"/>
-          </a:fillRef>
-          <a:effectRef idx="1">
-            <a:schemeClr val="dk1"/>
-          </a:effectRef>
-          <a:fontRef idx="minor">
-            <a:schemeClr val="tx1"/>
-          </a:fontRef>
-        </p:style>
-      </p:cxnSp>
-      <p:cxnSp>
-        <p:nvCxnSpPr>
-          <p:cNvPr id="19" name="Connettore 2 18">
-            <a:extLst>
-              <a:ext uri="{FF2B5EF4-FFF2-40B4-BE49-F238E27FC236}">
-                <a16:creationId xmlns:a16="http://schemas.microsoft.com/office/drawing/2014/main" id="{7A600D9B-640F-CA0A-E0DA-1A333BA88E1C}"/>
-              </a:ext>
-            </a:extLst>
-          </p:cNvPr>
-          <p:cNvCxnSpPr>
-            <a:cxnSpLocks/>
-          </p:cNvCxnSpPr>
-          <p:nvPr/>
-        </p:nvCxnSpPr>
-        <p:spPr>
-          <a:xfrm>
-            <a:off x="7172531" y="3297676"/>
-            <a:ext cx="1251626" cy="0"/>
-          </a:xfrm>
-          <a:prstGeom prst="straightConnector1">
-            <a:avLst/>
-          </a:prstGeom>
-          <a:ln>
-            <a:tailEnd type="triangle"/>
-          </a:ln>
-        </p:spPr>
-        <p:style>
-          <a:lnRef idx="2">
-            <a:schemeClr val="dk1"/>
-          </a:lnRef>
-          <a:fillRef idx="0">
-            <a:schemeClr val="dk1"/>
-          </a:fillRef>
-          <a:effectRef idx="1">
-            <a:schemeClr val="dk1"/>
-          </a:effectRef>
-          <a:fontRef idx="minor">
-            <a:schemeClr val="tx1"/>
-          </a:fontRef>
-        </p:style>
-      </p:cxnSp>
-      <p:cxnSp>
-        <p:nvCxnSpPr>
-          <p:cNvPr id="20" name="Connettore 2 19">
-            <a:extLst>
-              <a:ext uri="{FF2B5EF4-FFF2-40B4-BE49-F238E27FC236}">
-                <a16:creationId xmlns:a16="http://schemas.microsoft.com/office/drawing/2014/main" id="{A0718C81-4AC3-093F-8AE1-9BED9A481A2E}"/>
-              </a:ext>
-            </a:extLst>
-          </p:cNvPr>
-          <p:cNvCxnSpPr>
-            <a:cxnSpLocks/>
-          </p:cNvCxnSpPr>
-          <p:nvPr/>
-        </p:nvCxnSpPr>
-        <p:spPr>
-          <a:xfrm>
-            <a:off x="9894557" y="3301729"/>
-            <a:ext cx="1493293" cy="0"/>
-          </a:xfrm>
-          <a:prstGeom prst="straightConnector1">
-            <a:avLst/>
-          </a:prstGeom>
-          <a:ln>
-            <a:tailEnd type="triangle"/>
-          </a:ln>
-        </p:spPr>
-        <p:style>
-          <a:lnRef idx="2">
-            <a:schemeClr val="dk1"/>
-          </a:lnRef>
-          <a:fillRef idx="0">
-            <a:schemeClr val="dk1"/>
-          </a:fillRef>
-          <a:effectRef idx="1">
-            <a:schemeClr val="dk1"/>
-          </a:effectRef>
-          <a:fontRef idx="minor">
-            <a:schemeClr val="tx1"/>
-          </a:fontRef>
-        </p:style>
-      </p:cxnSp>
-      <p:pic>
-        <p:nvPicPr>
-          <p:cNvPr id="1030" name="Picture 6" descr="Mail, envelope, message, communication, social media, e-mail, letter ...">
-            <a:extLst>
-              <a:ext uri="{FF2B5EF4-FFF2-40B4-BE49-F238E27FC236}">
-                <a16:creationId xmlns:a16="http://schemas.microsoft.com/office/drawing/2014/main" id="{0507C602-2125-920C-125B-499B5ABC6EC1}"/>
-              </a:ext>
-            </a:extLst>
-          </p:cNvPr>
-          <p:cNvPicPr>
-            <a:picLocks noChangeAspect="1" noChangeArrowheads="1"/>
-          </p:cNvPicPr>
-          <p:nvPr/>
-        </p:nvPicPr>
-        <p:blipFill>
-          <a:blip r:embed="rId6">
-            <a:extLst>
-              <a:ext uri="{28A0092B-C50C-407E-A947-70E740481C1C}">
-                <a14:useLocalDpi xmlns:a14="http://schemas.microsoft.com/office/drawing/2010/main" val="0"/>
-              </a:ext>
-            </a:extLst>
-          </a:blip>
-          <a:srcRect/>
-          <a:stretch>
-            <a:fillRect/>
-          </a:stretch>
-        </p:blipFill>
-        <p:spPr bwMode="auto">
-          <a:xfrm>
-            <a:off x="2009007" y="2433233"/>
-            <a:ext cx="593260" cy="593260"/>
-          </a:xfrm>
-          <a:prstGeom prst="rect">
-            <a:avLst/>
-          </a:prstGeom>
-          <a:noFill/>
-          <a:extLst>
-            <a:ext uri="{909E8E84-426E-40DD-AFC4-6F175D3DCCD1}">
-              <a14:hiddenFill xmlns:a14="http://schemas.microsoft.com/office/drawing/2010/main">
-                <a:solidFill>
-                  <a:srgbClr val="FFFFFF"/>
-                </a:solidFill>
-              </a14:hiddenFill>
-            </a:ext>
-          </a:extLst>
-        </p:spPr>
-      </p:pic>
-      <p:sp>
-        <p:nvSpPr>
-          <p:cNvPr id="28" name="CasellaDiTesto 27">
-            <a:extLst>
-              <a:ext uri="{FF2B5EF4-FFF2-40B4-BE49-F238E27FC236}">
-                <a16:creationId xmlns:a16="http://schemas.microsoft.com/office/drawing/2014/main" id="{8770246B-9A3C-6E01-B81F-55782EE98AB3}"/>
-              </a:ext>
-            </a:extLst>
-          </p:cNvPr>
-          <p:cNvSpPr txBox="1"/>
-          <p:nvPr/>
-        </p:nvSpPr>
-        <p:spPr>
-          <a:xfrm>
-            <a:off x="2932293" y="4782537"/>
-            <a:ext cx="1997892" cy="646331"/>
-          </a:xfrm>
-          <a:prstGeom prst="rect">
-            <a:avLst/>
-          </a:prstGeom>
-          <a:noFill/>
-        </p:spPr>
-        <p:txBody>
-          <a:bodyPr wrap="square" rtlCol="0">
-            <a:spAutoFit/>
-          </a:bodyPr>
-          <a:lstStyle/>
+            <a:r>
+              <a:rPr lang="en-US" sz="1600" b="1">
+                <a:latin typeface="Consolas" panose="020B0609020204030204" pitchFamily="49" charset="0"/>
+              </a:rPr>
+              <a:t>+</a:t>
+            </a:r>
+          </a:p>
           <a:p>
             <a:pPr algn="ctr"/>
             <a:r>
-              <a:rPr lang="it-IT">
-                <a:solidFill>
-                  <a:schemeClr val="accent2">
-                    <a:lumMod val="75000"/>
-                  </a:schemeClr>
-                </a:solidFill>
-                <a:latin typeface="Consolas" panose="020B0609020204030204" pitchFamily="49" charset="0"/>
-              </a:rPr>
-              <a:t>INTENT IDENTIFICATION</a:t>
-            </a:r>
-            <a:endParaRPr lang="en-US">
-              <a:solidFill>
-                <a:schemeClr val="accent2">
-                  <a:lumMod val="75000"/>
-                </a:schemeClr>
-              </a:solidFill>
-              <a:latin typeface="Consolas" panose="020B0609020204030204" pitchFamily="49" charset="0"/>
-            </a:endParaRPr>
-          </a:p>
-        </p:txBody>
-      </p:sp>
-      <p:sp>
-        <p:nvSpPr>
-          <p:cNvPr id="31" name="Arco 30">
-            <a:extLst>
-              <a:ext uri="{FF2B5EF4-FFF2-40B4-BE49-F238E27FC236}">
-                <a16:creationId xmlns:a16="http://schemas.microsoft.com/office/drawing/2014/main" id="{E257A346-04C3-FC3E-21CB-4B3678868D47}"/>
-              </a:ext>
-            </a:extLst>
-          </p:cNvPr>
-          <p:cNvSpPr/>
-          <p:nvPr/>
-        </p:nvSpPr>
-        <p:spPr>
-          <a:xfrm>
-            <a:off x="8980300" y="3975959"/>
-            <a:ext cx="761763" cy="761763"/>
-          </a:xfrm>
-          <a:prstGeom prst="arc">
-            <a:avLst>
-              <a:gd name="adj1" fmla="val 18032190"/>
-              <a:gd name="adj2" fmla="val 14403248"/>
-            </a:avLst>
-          </a:prstGeom>
-          <a:ln>
-            <a:solidFill>
-              <a:schemeClr val="accent2">
-                <a:lumMod val="75000"/>
-              </a:schemeClr>
-            </a:solidFill>
-            <a:headEnd type="none" w="med" len="med"/>
-            <a:tailEnd type="triangle" w="med" len="med"/>
-          </a:ln>
-        </p:spPr>
-        <p:style>
-          <a:lnRef idx="2">
-            <a:schemeClr val="dk1"/>
-          </a:lnRef>
-          <a:fillRef idx="0">
-            <a:schemeClr val="dk1"/>
-          </a:fillRef>
-          <a:effectRef idx="1">
-            <a:schemeClr val="dk1"/>
-          </a:effectRef>
-          <a:fontRef idx="minor">
-            <a:schemeClr val="tx1"/>
-          </a:fontRef>
-        </p:style>
-        <p:txBody>
-          <a:bodyPr rtlCol="0" anchor="ctr"/>
-          <a:lstStyle/>
-          <a:p>
-            <a:pPr algn="ctr"/>
-            <a:endParaRPr lang="en-US"/>
-          </a:p>
-        </p:txBody>
-      </p:sp>
-      <p:sp>
-        <p:nvSpPr>
-          <p:cNvPr id="32" name="CasellaDiTesto 31">
-            <a:extLst>
-              <a:ext uri="{FF2B5EF4-FFF2-40B4-BE49-F238E27FC236}">
-                <a16:creationId xmlns:a16="http://schemas.microsoft.com/office/drawing/2014/main" id="{21CBE70F-ADCA-1960-4F84-4C9599641338}"/>
-              </a:ext>
-            </a:extLst>
-          </p:cNvPr>
-          <p:cNvSpPr txBox="1"/>
-          <p:nvPr/>
-        </p:nvSpPr>
-        <p:spPr>
-          <a:xfrm>
-            <a:off x="6987632" y="4782537"/>
-            <a:ext cx="4747097" cy="646331"/>
-          </a:xfrm>
-          <a:prstGeom prst="rect">
-            <a:avLst/>
-          </a:prstGeom>
-          <a:noFill/>
-        </p:spPr>
-        <p:txBody>
-          <a:bodyPr wrap="square" rtlCol="0">
-            <a:spAutoFit/>
-          </a:bodyPr>
-          <a:lstStyle/>
-          <a:p>
-            <a:pPr algn="ctr"/>
-            <a:r>
-              <a:rPr lang="it-IT">
-                <a:solidFill>
-                  <a:schemeClr val="accent2">
-                    <a:lumMod val="75000"/>
-                  </a:schemeClr>
-                </a:solidFill>
-                <a:latin typeface="Consolas" panose="020B0609020204030204" pitchFamily="49" charset="0"/>
-              </a:rPr>
-              <a:t>RESPONSE GENERATION </a:t>
-            </a:r>
-          </a:p>
-          <a:p>
-            <a:pPr algn="ctr"/>
-            <a:r>
-              <a:rPr lang="it-IT">
-                <a:solidFill>
-                  <a:schemeClr val="accent2">
-                    <a:lumMod val="75000"/>
-                  </a:schemeClr>
-                </a:solidFill>
-                <a:latin typeface="Consolas" panose="020B0609020204030204" pitchFamily="49" charset="0"/>
-              </a:rPr>
-              <a:t>(BASED ON QUERY AND RETRIVED DOCS)</a:t>
-            </a:r>
-            <a:endParaRPr lang="en-US">
-              <a:solidFill>
-                <a:schemeClr val="accent2">
-                  <a:lumMod val="75000"/>
-                </a:schemeClr>
-              </a:solidFill>
-              <a:latin typeface="Consolas" panose="020B0609020204030204" pitchFamily="49" charset="0"/>
-            </a:endParaRPr>
-          </a:p>
-        </p:txBody>
-      </p:sp>
-      <p:pic>
-        <p:nvPicPr>
-          <p:cNvPr id="33" name="Picture 6" descr="Mail, envelope, message, communication, social media, e-mail, letter ...">
-            <a:extLst>
-              <a:ext uri="{FF2B5EF4-FFF2-40B4-BE49-F238E27FC236}">
-                <a16:creationId xmlns:a16="http://schemas.microsoft.com/office/drawing/2014/main" id="{345C3398-93C7-334F-E9B0-4F63BED55DC1}"/>
-              </a:ext>
-            </a:extLst>
-          </p:cNvPr>
-          <p:cNvPicPr>
-            <a:picLocks noChangeAspect="1" noChangeArrowheads="1"/>
-          </p:cNvPicPr>
-          <p:nvPr/>
-        </p:nvPicPr>
-        <p:blipFill>
-          <a:blip r:embed="rId6">
-            <a:extLst>
-              <a:ext uri="{28A0092B-C50C-407E-A947-70E740481C1C}">
-                <a14:useLocalDpi xmlns:a14="http://schemas.microsoft.com/office/drawing/2010/main" val="0"/>
-              </a:ext>
-            </a:extLst>
-          </a:blip>
-          <a:srcRect/>
-          <a:stretch>
-            <a:fillRect/>
-          </a:stretch>
-        </p:blipFill>
-        <p:spPr bwMode="auto">
-          <a:xfrm>
-            <a:off x="4897578" y="2433233"/>
-            <a:ext cx="593260" cy="593260"/>
-          </a:xfrm>
-          <a:prstGeom prst="rect">
-            <a:avLst/>
-          </a:prstGeom>
-          <a:noFill/>
-          <a:extLst>
-            <a:ext uri="{909E8E84-426E-40DD-AFC4-6F175D3DCCD1}">
-              <a14:hiddenFill xmlns:a14="http://schemas.microsoft.com/office/drawing/2010/main">
-                <a:solidFill>
-                  <a:srgbClr val="FFFFFF"/>
-                </a:solidFill>
-              </a14:hiddenFill>
-            </a:ext>
-          </a:extLst>
-        </p:spPr>
-      </p:pic>
-      <p:pic>
-        <p:nvPicPr>
-          <p:cNvPr id="34" name="Picture 6" descr="Mail, envelope, message, communication, social media, e-mail, letter ...">
-            <a:extLst>
-              <a:ext uri="{FF2B5EF4-FFF2-40B4-BE49-F238E27FC236}">
-                <a16:creationId xmlns:a16="http://schemas.microsoft.com/office/drawing/2014/main" id="{4E985A88-18B1-950A-76B5-D968AC14F746}"/>
-              </a:ext>
-            </a:extLst>
-          </p:cNvPr>
-          <p:cNvPicPr>
-            <a:picLocks noChangeAspect="1" noChangeArrowheads="1"/>
-          </p:cNvPicPr>
-          <p:nvPr/>
-        </p:nvPicPr>
-        <p:blipFill>
-          <a:blip r:embed="rId6">
-            <a:extLst>
-              <a:ext uri="{28A0092B-C50C-407E-A947-70E740481C1C}">
-                <a14:useLocalDpi xmlns:a14="http://schemas.microsoft.com/office/drawing/2010/main" val="0"/>
-              </a:ext>
-            </a:extLst>
-          </a:blip>
-          <a:srcRect/>
-          <a:stretch>
-            <a:fillRect/>
-          </a:stretch>
-        </p:blipFill>
-        <p:spPr bwMode="auto">
-          <a:xfrm>
-            <a:off x="7472116" y="2433233"/>
-            <a:ext cx="593260" cy="593260"/>
-          </a:xfrm>
-          <a:prstGeom prst="rect">
-            <a:avLst/>
-          </a:prstGeom>
-          <a:noFill/>
-          <a:extLst>
-            <a:ext uri="{909E8E84-426E-40DD-AFC4-6F175D3DCCD1}">
-              <a14:hiddenFill xmlns:a14="http://schemas.microsoft.com/office/drawing/2010/main">
-                <a:solidFill>
-                  <a:srgbClr val="FFFFFF"/>
-                </a:solidFill>
-              </a14:hiddenFill>
-            </a:ext>
-          </a:extLst>
-        </p:spPr>
-      </p:pic>
-      <p:pic>
-        <p:nvPicPr>
-          <p:cNvPr id="35" name="Picture 6" descr="Mail, envelope, message, communication, social media, e-mail, letter ...">
-            <a:extLst>
-              <a:ext uri="{FF2B5EF4-FFF2-40B4-BE49-F238E27FC236}">
-                <a16:creationId xmlns:a16="http://schemas.microsoft.com/office/drawing/2014/main" id="{2A76942E-CB7E-2D9C-75CA-2FE04CBECAE1}"/>
-              </a:ext>
-            </a:extLst>
-          </p:cNvPr>
-          <p:cNvPicPr>
-            <a:picLocks noChangeAspect="1" noChangeArrowheads="1"/>
-          </p:cNvPicPr>
-          <p:nvPr/>
-        </p:nvPicPr>
-        <p:blipFill>
-          <a:blip r:embed="rId6">
-            <a:extLst>
-              <a:ext uri="{28A0092B-C50C-407E-A947-70E740481C1C}">
-                <a14:useLocalDpi xmlns:a14="http://schemas.microsoft.com/office/drawing/2010/main" val="0"/>
-              </a:ext>
-            </a:extLst>
-          </a:blip>
-          <a:srcRect/>
-          <a:stretch>
-            <a:fillRect/>
-          </a:stretch>
-        </p:blipFill>
-        <p:spPr bwMode="auto">
-          <a:xfrm>
-            <a:off x="10422049" y="2433233"/>
-            <a:ext cx="593260" cy="593260"/>
-          </a:xfrm>
-          <a:prstGeom prst="rect">
-            <a:avLst/>
-          </a:prstGeom>
-          <a:noFill/>
-          <a:extLst>
-            <a:ext uri="{909E8E84-426E-40DD-AFC4-6F175D3DCCD1}">
-              <a14:hiddenFill xmlns:a14="http://schemas.microsoft.com/office/drawing/2010/main">
-                <a:solidFill>
-                  <a:srgbClr val="FFFFFF"/>
-                </a:solidFill>
-              </a14:hiddenFill>
-            </a:ext>
-          </a:extLst>
-        </p:spPr>
-      </p:pic>
-      <p:sp>
-        <p:nvSpPr>
-          <p:cNvPr id="37" name="CasellaDiTesto 36">
-            <a:extLst>
-              <a:ext uri="{FF2B5EF4-FFF2-40B4-BE49-F238E27FC236}">
-                <a16:creationId xmlns:a16="http://schemas.microsoft.com/office/drawing/2014/main" id="{AA6B77B6-9134-4A5E-815D-B6C093DAB3EA}"/>
-              </a:ext>
-            </a:extLst>
-          </p:cNvPr>
-          <p:cNvSpPr txBox="1"/>
-          <p:nvPr/>
-        </p:nvSpPr>
-        <p:spPr>
-          <a:xfrm>
-            <a:off x="1938192" y="2155565"/>
-            <a:ext cx="817123" cy="338554"/>
-          </a:xfrm>
-          <a:prstGeom prst="rect">
-            <a:avLst/>
-          </a:prstGeom>
-          <a:noFill/>
-        </p:spPr>
-        <p:txBody>
-          <a:bodyPr wrap="square" rtlCol="0">
-            <a:spAutoFit/>
-          </a:bodyPr>
-          <a:lstStyle/>
-          <a:p>
-            <a:r>
               <a:rPr lang="it-IT" sz="1600" b="1">
-                <a:solidFill>
-                  <a:srgbClr val="BA8212"/>
-                </a:solidFill>
-                <a:latin typeface="Consolas" panose="020B0609020204030204" pitchFamily="49" charset="0"/>
-              </a:rPr>
-              <a:t>QUERY</a:t>
-            </a:r>
-            <a:endParaRPr lang="en-US" sz="1600" b="1">
-              <a:solidFill>
-                <a:srgbClr val="BA8212"/>
-              </a:solidFill>
-              <a:latin typeface="Consolas" panose="020B0609020204030204" pitchFamily="49" charset="0"/>
-            </a:endParaRPr>
-          </a:p>
-        </p:txBody>
-      </p:sp>
-      <p:sp>
-        <p:nvSpPr>
-          <p:cNvPr id="38" name="CasellaDiTesto 37">
-            <a:extLst>
-              <a:ext uri="{FF2B5EF4-FFF2-40B4-BE49-F238E27FC236}">
-                <a16:creationId xmlns:a16="http://schemas.microsoft.com/office/drawing/2014/main" id="{09432D18-A1B5-C1B2-10C3-54720828A869}"/>
-              </a:ext>
-            </a:extLst>
-          </p:cNvPr>
-          <p:cNvSpPr txBox="1"/>
-          <p:nvPr/>
-        </p:nvSpPr>
-        <p:spPr>
-          <a:xfrm>
-            <a:off x="4804210" y="1918951"/>
-            <a:ext cx="1569758" cy="584775"/>
-          </a:xfrm>
-          <a:prstGeom prst="rect">
-            <a:avLst/>
-          </a:prstGeom>
-          <a:noFill/>
-        </p:spPr>
-        <p:txBody>
-          <a:bodyPr wrap="square" rtlCol="0">
-            <a:spAutoFit/>
-          </a:bodyPr>
-          <a:lstStyle/>
-          <a:p>
-            <a:r>
-              <a:rPr lang="it-IT" sz="1600" b="1">
-                <a:solidFill>
-                  <a:srgbClr val="BA8212"/>
-                </a:solidFill>
-                <a:latin typeface="Consolas" panose="020B0609020204030204" pitchFamily="49" charset="0"/>
-              </a:rPr>
-              <a:t>OPTIMIZED QUERY</a:t>
-            </a:r>
-            <a:endParaRPr lang="en-US" sz="1600" b="1">
-              <a:solidFill>
-                <a:srgbClr val="BA8212"/>
-              </a:solidFill>
-              <a:latin typeface="Consolas" panose="020B0609020204030204" pitchFamily="49" charset="0"/>
-            </a:endParaRPr>
-          </a:p>
-        </p:txBody>
-      </p:sp>
-      <p:sp>
-        <p:nvSpPr>
-          <p:cNvPr id="39" name="CasellaDiTesto 38">
-            <a:extLst>
-              <a:ext uri="{FF2B5EF4-FFF2-40B4-BE49-F238E27FC236}">
-                <a16:creationId xmlns:a16="http://schemas.microsoft.com/office/drawing/2014/main" id="{78258649-B6D0-E61B-E192-A5D749BB8B39}"/>
-              </a:ext>
-            </a:extLst>
-          </p:cNvPr>
-          <p:cNvSpPr txBox="1"/>
-          <p:nvPr/>
-        </p:nvSpPr>
-        <p:spPr>
-          <a:xfrm>
-            <a:off x="10323087" y="2155565"/>
-            <a:ext cx="1129611" cy="338554"/>
-          </a:xfrm>
-          <a:prstGeom prst="rect">
-            <a:avLst/>
-          </a:prstGeom>
-          <a:noFill/>
-        </p:spPr>
-        <p:txBody>
-          <a:bodyPr wrap="square" rtlCol="0">
-            <a:spAutoFit/>
-          </a:bodyPr>
-          <a:lstStyle/>
-          <a:p>
-            <a:r>
-              <a:rPr lang="it-IT" sz="1600" b="1">
-                <a:solidFill>
-                  <a:srgbClr val="BA8212"/>
-                </a:solidFill>
-                <a:latin typeface="Consolas" panose="020B0609020204030204" pitchFamily="49" charset="0"/>
-              </a:rPr>
-              <a:t>RESPONSE</a:t>
-            </a:r>
-            <a:endParaRPr lang="en-US" sz="1600" b="1">
-              <a:solidFill>
-                <a:srgbClr val="BA8212"/>
-              </a:solidFill>
-              <a:latin typeface="Consolas" panose="020B0609020204030204" pitchFamily="49" charset="0"/>
-            </a:endParaRPr>
-          </a:p>
-        </p:txBody>
-      </p:sp>
-      <p:sp>
-        <p:nvSpPr>
-          <p:cNvPr id="40" name="CasellaDiTesto 39">
-            <a:extLst>
-              <a:ext uri="{FF2B5EF4-FFF2-40B4-BE49-F238E27FC236}">
-                <a16:creationId xmlns:a16="http://schemas.microsoft.com/office/drawing/2014/main" id="{1EF7802B-7DE4-91D6-B86E-6FBF23431057}"/>
-              </a:ext>
-            </a:extLst>
-          </p:cNvPr>
-          <p:cNvSpPr txBox="1"/>
-          <p:nvPr/>
-        </p:nvSpPr>
-        <p:spPr>
-          <a:xfrm>
-            <a:off x="5817144" y="3560324"/>
-            <a:ext cx="2199705" cy="400110"/>
-          </a:xfrm>
-          <a:prstGeom prst="rect">
-            <a:avLst/>
-          </a:prstGeom>
-          <a:noFill/>
-        </p:spPr>
-        <p:txBody>
-          <a:bodyPr wrap="square" rtlCol="0">
-            <a:spAutoFit/>
-          </a:bodyPr>
-          <a:lstStyle/>
-          <a:p>
-            <a:r>
-              <a:rPr lang="it-IT" sz="2000" b="1">
-                <a:solidFill>
-                  <a:srgbClr val="0079D6"/>
-                </a:solidFill>
-                <a:latin typeface="Consolas" panose="020B0609020204030204" pitchFamily="49" charset="0"/>
-              </a:rPr>
-              <a:t>AI SEARCH</a:t>
-            </a:r>
-            <a:endParaRPr lang="en-US" sz="2000" b="1">
-              <a:solidFill>
-                <a:srgbClr val="0079D6"/>
-              </a:solidFill>
-              <a:latin typeface="Consolas" panose="020B0609020204030204" pitchFamily="49" charset="0"/>
-            </a:endParaRPr>
-          </a:p>
-        </p:txBody>
-      </p:sp>
-      <p:sp>
-        <p:nvSpPr>
-          <p:cNvPr id="41" name="CasellaDiTesto 40">
-            <a:extLst>
-              <a:ext uri="{FF2B5EF4-FFF2-40B4-BE49-F238E27FC236}">
-                <a16:creationId xmlns:a16="http://schemas.microsoft.com/office/drawing/2014/main" id="{B80D2CCB-D521-4997-21BA-CF43EB7A8F6E}"/>
-              </a:ext>
-            </a:extLst>
-          </p:cNvPr>
-          <p:cNvSpPr txBox="1"/>
-          <p:nvPr/>
-        </p:nvSpPr>
-        <p:spPr>
-          <a:xfrm>
-            <a:off x="7361672" y="2157533"/>
-            <a:ext cx="1569758" cy="338554"/>
-          </a:xfrm>
-          <a:prstGeom prst="rect">
-            <a:avLst/>
-          </a:prstGeom>
-          <a:noFill/>
-        </p:spPr>
-        <p:txBody>
-          <a:bodyPr wrap="square" rtlCol="0">
-            <a:spAutoFit/>
-          </a:bodyPr>
-          <a:lstStyle/>
-          <a:p>
-            <a:r>
-              <a:rPr lang="it-IT" sz="1600" b="1">
-                <a:solidFill>
-                  <a:srgbClr val="BA8212"/>
-                </a:solidFill>
-                <a:latin typeface="Consolas" panose="020B0609020204030204" pitchFamily="49" charset="0"/>
-              </a:rPr>
-              <a:t>TOP DOCS</a:t>
-            </a:r>
-            <a:endParaRPr lang="en-US" sz="1600" b="1">
-              <a:solidFill>
-                <a:srgbClr val="BA8212"/>
-              </a:solidFill>
+                <a:latin typeface="Consolas" panose="020B0609020204030204" pitchFamily="49" charset="0"/>
+              </a:rPr>
+              <a:t>Query</a:t>
+            </a:r>
+            <a:endParaRPr lang="it-IT" sz="1600">
               <a:latin typeface="Consolas" panose="020B0609020204030204" pitchFamily="49" charset="0"/>
             </a:endParaRPr>
           </a:p>
@@ -6273,7 +5671,7 @@
     </p:spTree>
     <p:extLst>
       <p:ext uri="{BB962C8B-B14F-4D97-AF65-F5344CB8AC3E}">
-        <p14:creationId xmlns:p14="http://schemas.microsoft.com/office/powerpoint/2010/main" val="2918096465"/>
+        <p14:creationId xmlns:p14="http://schemas.microsoft.com/office/powerpoint/2010/main" val="8740249"/>
       </p:ext>
     </p:extLst>
   </p:cSld>
@@ -6283,7 +5681,7 @@
 </p:sld>
 </file>
 
-<file path=ppt/slides/slide10.xml><?xml version="1.0" encoding="utf-8"?>
+<file path=ppt/slides/slide11.xml><?xml version="1.0" encoding="utf-8"?>
 <p:sld xmlns:a="http://schemas.openxmlformats.org/drawingml/2006/main" xmlns:r="http://schemas.openxmlformats.org/officeDocument/2006/relationships" xmlns:p="http://schemas.openxmlformats.org/presentationml/2006/main">
   <p:cSld>
     <p:bg>
@@ -7391,7 +6789,7 @@
 </p:sld>
 </file>
 
-<file path=ppt/slides/slide11.xml><?xml version="1.0" encoding="utf-8"?>
+<file path=ppt/slides/slide12.xml><?xml version="1.0" encoding="utf-8"?>
 <p:sld xmlns:a="http://schemas.openxmlformats.org/drawingml/2006/main" xmlns:r="http://schemas.openxmlformats.org/officeDocument/2006/relationships" xmlns:p="http://schemas.openxmlformats.org/presentationml/2006/main">
   <p:cSld>
     <p:bg>
@@ -9091,12 +8489,42 @@
 </p:sld>
 </file>
 
-<file path=ppt/slides/slide12.xml><?xml version="1.0" encoding="utf-8"?>
+<file path=ppt/slides/slide2.xml><?xml version="1.0" encoding="utf-8"?>
 <p:sld xmlns:a="http://schemas.openxmlformats.org/drawingml/2006/main" xmlns:r="http://schemas.openxmlformats.org/officeDocument/2006/relationships" xmlns:p="http://schemas.openxmlformats.org/presentationml/2006/main">
   <p:cSld>
+    <p:bg>
+      <p:bgPr>
+        <a:gradFill>
+          <a:gsLst>
+            <a:gs pos="0">
+              <a:srgbClr val="7030A0">
+                <a:alpha val="39000"/>
+              </a:srgbClr>
+            </a:gs>
+            <a:gs pos="100000">
+              <a:schemeClr val="tx2">
+                <a:alpha val="50000"/>
+                <a:lumMod val="60000"/>
+                <a:lumOff val="40000"/>
+              </a:schemeClr>
+            </a:gs>
+          </a:gsLst>
+          <a:path path="circle">
+            <a:fillToRect l="100000" b="100000"/>
+          </a:path>
+        </a:gradFill>
+        <a:effectLst/>
+      </p:bgPr>
+    </p:bg>
     <p:spTree>
       <p:nvGrpSpPr>
-        <p:cNvPr id="1" name=""/>
+        <p:cNvPr id="1" name="">
+          <a:extLst>
+            <a:ext uri="{FF2B5EF4-FFF2-40B4-BE49-F238E27FC236}">
+              <a16:creationId xmlns:a16="http://schemas.microsoft.com/office/drawing/2014/main" id="{72534A3F-204E-BD24-71EF-7DC74E19AD0F}"/>
+            </a:ext>
+          </a:extLst>
+        </p:cNvPr>
         <p:cNvGrpSpPr/>
         <p:nvPr/>
       </p:nvGrpSpPr>
@@ -9108,10 +8536,1132 @@
           <a:chExt cx="0" cy="0"/>
         </a:xfrm>
       </p:grpSpPr>
+      <p:pic>
+        <p:nvPicPr>
+          <p:cNvPr id="1026" name="Picture 2" descr="User Icon Transparent Background">
+            <a:extLst>
+              <a:ext uri="{FF2B5EF4-FFF2-40B4-BE49-F238E27FC236}">
+                <a16:creationId xmlns:a16="http://schemas.microsoft.com/office/drawing/2014/main" id="{2D9BE641-DCF0-8597-08FC-04D23E2E3CCF}"/>
+              </a:ext>
+            </a:extLst>
+          </p:cNvPr>
+          <p:cNvPicPr>
+            <a:picLocks noChangeAspect="1" noChangeArrowheads="1"/>
+          </p:cNvPicPr>
+          <p:nvPr/>
+        </p:nvPicPr>
+        <p:blipFill>
+          <a:blip r:embed="rId2">
+            <a:extLst>
+              <a:ext uri="{BEBA8EAE-BF5A-486C-A8C5-ECC9F3942E4B}">
+                <a14:imgProps xmlns:a14="http://schemas.microsoft.com/office/drawing/2010/main">
+                  <a14:imgLayer r:embed="rId3">
+                    <a14:imgEffect>
+                      <a14:backgroundRemoval t="4509" b="89827" l="9070" r="90000">
+                        <a14:foregroundMark x1="36977" y1="9595" x2="47314" y2="4981"/>
+                        <a14:foregroundMark x1="48706" y1="4740" x2="57907" y2="11098"/>
+                        <a14:foregroundMark x1="57907" y1="11098" x2="57907" y2="11329"/>
+                        <a14:foregroundMark x1="27558" y1="63353" x2="30349" y2="62428"/>
+                        <a14:foregroundMark x1="70698" y1="62890" x2="70698" y2="62890"/>
+                        <a14:foregroundMark x1="9070" y1="82197" x2="9070" y2="82197"/>
+                        <a14:backgroundMark x1="47791" y1="4277" x2="47791" y2="4277"/>
+                        <a14:backgroundMark x1="48140" y1="4740" x2="48140" y2="4740"/>
+                        <a14:backgroundMark x1="47442" y1="4740" x2="49186" y2="4162"/>
+                        <a14:backgroundMark x1="48605" y1="4277" x2="48605" y2="4277"/>
+                      </a14:backgroundRemoval>
+                    </a14:imgEffect>
+                  </a14:imgLayer>
+                </a14:imgProps>
+              </a:ext>
+              <a:ext uri="{28A0092B-C50C-407E-A947-70E740481C1C}">
+                <a14:useLocalDpi xmlns:a14="http://schemas.microsoft.com/office/drawing/2010/main" val="0"/>
+              </a:ext>
+            </a:extLst>
+          </a:blip>
+          <a:srcRect/>
+          <a:stretch>
+            <a:fillRect/>
+          </a:stretch>
+        </p:blipFill>
+        <p:spPr bwMode="auto">
+          <a:xfrm>
+            <a:off x="180684" y="2536494"/>
+            <a:ext cx="1529674" cy="1538577"/>
+          </a:xfrm>
+          <a:prstGeom prst="rect">
+            <a:avLst/>
+          </a:prstGeom>
+          <a:noFill/>
+          <a:extLst>
+            <a:ext uri="{909E8E84-426E-40DD-AFC4-6F175D3DCCD1}">
+              <a14:hiddenFill xmlns:a14="http://schemas.microsoft.com/office/drawing/2010/main">
+                <a:solidFill>
+                  <a:srgbClr val="FFFFFF"/>
+                </a:solidFill>
+              </a14:hiddenFill>
+            </a:ext>
+          </a:extLst>
+        </p:spPr>
+      </p:pic>
+      <p:cxnSp>
+        <p:nvCxnSpPr>
+          <p:cNvPr id="12" name="Connettore 2 11">
+            <a:extLst>
+              <a:ext uri="{FF2B5EF4-FFF2-40B4-BE49-F238E27FC236}">
+                <a16:creationId xmlns:a16="http://schemas.microsoft.com/office/drawing/2014/main" id="{24E7F5E1-0F27-6273-5F8F-4C0E7387DE09}"/>
+              </a:ext>
+            </a:extLst>
+          </p:cNvPr>
+          <p:cNvCxnSpPr>
+            <a:cxnSpLocks/>
+          </p:cNvCxnSpPr>
+          <p:nvPr/>
+        </p:nvCxnSpPr>
+        <p:spPr>
+          <a:xfrm>
+            <a:off x="1549940" y="3297676"/>
+            <a:ext cx="1433209" cy="0"/>
+          </a:xfrm>
+          <a:prstGeom prst="straightConnector1">
+            <a:avLst/>
+          </a:prstGeom>
+          <a:ln>
+            <a:tailEnd type="triangle"/>
+          </a:ln>
+        </p:spPr>
+        <p:style>
+          <a:lnRef idx="2">
+            <a:schemeClr val="dk1"/>
+          </a:lnRef>
+          <a:fillRef idx="0">
+            <a:schemeClr val="dk1"/>
+          </a:fillRef>
+          <a:effectRef idx="1">
+            <a:schemeClr val="dk1"/>
+          </a:effectRef>
+          <a:fontRef idx="minor">
+            <a:schemeClr val="tx1"/>
+          </a:fontRef>
+        </p:style>
+      </p:cxnSp>
+      <p:pic>
+        <p:nvPicPr>
+          <p:cNvPr id="1028" name="Picture 4" descr="Gear Icon Png">
+            <a:extLst>
+              <a:ext uri="{FF2B5EF4-FFF2-40B4-BE49-F238E27FC236}">
+                <a16:creationId xmlns:a16="http://schemas.microsoft.com/office/drawing/2014/main" id="{4B145B89-8258-2ED1-F57D-2834E4570CBB}"/>
+              </a:ext>
+            </a:extLst>
+          </p:cNvPr>
+          <p:cNvPicPr>
+            <a:picLocks noChangeAspect="1" noChangeArrowheads="1"/>
+          </p:cNvPicPr>
+          <p:nvPr/>
+        </p:nvPicPr>
+        <p:blipFill>
+          <a:blip r:embed="rId4">
+            <a:extLst>
+              <a:ext uri="{28A0092B-C50C-407E-A947-70E740481C1C}">
+                <a14:useLocalDpi xmlns:a14="http://schemas.microsoft.com/office/drawing/2010/main" val="0"/>
+              </a:ext>
+            </a:extLst>
+          </a:blip>
+          <a:srcRect/>
+          <a:stretch>
+            <a:fillRect/>
+          </a:stretch>
+        </p:blipFill>
+        <p:spPr bwMode="auto">
+          <a:xfrm>
+            <a:off x="3124551" y="2601344"/>
+            <a:ext cx="1296773" cy="1154350"/>
+          </a:xfrm>
+          <a:prstGeom prst="rect">
+            <a:avLst/>
+          </a:prstGeom>
+          <a:noFill/>
+          <a:extLst>
+            <a:ext uri="{909E8E84-426E-40DD-AFC4-6F175D3DCCD1}">
+              <a14:hiddenFill xmlns:a14="http://schemas.microsoft.com/office/drawing/2010/main">
+                <a:solidFill>
+                  <a:srgbClr val="FFFFFF"/>
+                </a:solidFill>
+              </a14:hiddenFill>
+            </a:ext>
+          </a:extLst>
+        </p:spPr>
+      </p:pic>
+      <p:sp>
+        <p:nvSpPr>
+          <p:cNvPr id="13" name="CasellaDiTesto 12">
+            <a:extLst>
+              <a:ext uri="{FF2B5EF4-FFF2-40B4-BE49-F238E27FC236}">
+                <a16:creationId xmlns:a16="http://schemas.microsoft.com/office/drawing/2014/main" id="{4889B84F-EDF5-CD1C-8260-87BE31895F10}"/>
+              </a:ext>
+            </a:extLst>
+          </p:cNvPr>
+          <p:cNvSpPr txBox="1"/>
+          <p:nvPr/>
+        </p:nvSpPr>
+        <p:spPr>
+          <a:xfrm>
+            <a:off x="3670571" y="3407923"/>
+            <a:ext cx="817123" cy="523220"/>
+          </a:xfrm>
+          <a:prstGeom prst="rect">
+            <a:avLst/>
+          </a:prstGeom>
+          <a:noFill/>
+        </p:spPr>
+        <p:txBody>
+          <a:bodyPr wrap="square" rtlCol="0">
+            <a:spAutoFit/>
+          </a:bodyPr>
+          <a:lstStyle/>
+          <a:p>
+            <a:r>
+              <a:rPr lang="it-IT" sz="2800" b="1">
+                <a:solidFill>
+                  <a:schemeClr val="tx1">
+                    <a:lumMod val="75000"/>
+                    <a:lumOff val="25000"/>
+                  </a:schemeClr>
+                </a:solidFill>
+                <a:latin typeface="Consolas" panose="020B0609020204030204" pitchFamily="49" charset="0"/>
+              </a:rPr>
+              <a:t>LLM</a:t>
+            </a:r>
+            <a:endParaRPr lang="en-US" sz="2800" b="1">
+              <a:solidFill>
+                <a:schemeClr val="tx1">
+                  <a:lumMod val="75000"/>
+                  <a:lumOff val="25000"/>
+                </a:schemeClr>
+              </a:solidFill>
+              <a:latin typeface="Consolas" panose="020B0609020204030204" pitchFamily="49" charset="0"/>
+            </a:endParaRPr>
+          </a:p>
+        </p:txBody>
+      </p:sp>
+      <p:pic>
+        <p:nvPicPr>
+          <p:cNvPr id="14" name="Picture 4" descr="Gear Icon Png">
+            <a:extLst>
+              <a:ext uri="{FF2B5EF4-FFF2-40B4-BE49-F238E27FC236}">
+                <a16:creationId xmlns:a16="http://schemas.microsoft.com/office/drawing/2014/main" id="{496762AE-242C-5F91-889B-FAB7273FC879}"/>
+              </a:ext>
+            </a:extLst>
+          </p:cNvPr>
+          <p:cNvPicPr>
+            <a:picLocks noChangeAspect="1" noChangeArrowheads="1"/>
+          </p:cNvPicPr>
+          <p:nvPr/>
+        </p:nvPicPr>
+        <p:blipFill>
+          <a:blip r:embed="rId4">
+            <a:extLst>
+              <a:ext uri="{28A0092B-C50C-407E-A947-70E740481C1C}">
+                <a14:useLocalDpi xmlns:a14="http://schemas.microsoft.com/office/drawing/2010/main" val="0"/>
+              </a:ext>
+            </a:extLst>
+          </a:blip>
+          <a:srcRect/>
+          <a:stretch>
+            <a:fillRect/>
+          </a:stretch>
+        </p:blipFill>
+        <p:spPr bwMode="auto">
+          <a:xfrm>
+            <a:off x="8498737" y="2601344"/>
+            <a:ext cx="1296773" cy="1154350"/>
+          </a:xfrm>
+          <a:prstGeom prst="rect">
+            <a:avLst/>
+          </a:prstGeom>
+          <a:noFill/>
+          <a:extLst>
+            <a:ext uri="{909E8E84-426E-40DD-AFC4-6F175D3DCCD1}">
+              <a14:hiddenFill xmlns:a14="http://schemas.microsoft.com/office/drawing/2010/main">
+                <a:solidFill>
+                  <a:srgbClr val="FFFFFF"/>
+                </a:solidFill>
+              </a14:hiddenFill>
+            </a:ext>
+          </a:extLst>
+        </p:spPr>
+      </p:pic>
+      <p:sp>
+        <p:nvSpPr>
+          <p:cNvPr id="15" name="CasellaDiTesto 14">
+            <a:extLst>
+              <a:ext uri="{FF2B5EF4-FFF2-40B4-BE49-F238E27FC236}">
+                <a16:creationId xmlns:a16="http://schemas.microsoft.com/office/drawing/2014/main" id="{45AC6EA8-F58A-26C6-26C9-1F527D6DA755}"/>
+              </a:ext>
+            </a:extLst>
+          </p:cNvPr>
+          <p:cNvSpPr txBox="1"/>
+          <p:nvPr/>
+        </p:nvSpPr>
+        <p:spPr>
+          <a:xfrm>
+            <a:off x="9044757" y="3407923"/>
+            <a:ext cx="817123" cy="523220"/>
+          </a:xfrm>
+          <a:prstGeom prst="rect">
+            <a:avLst/>
+          </a:prstGeom>
+          <a:noFill/>
+        </p:spPr>
+        <p:txBody>
+          <a:bodyPr wrap="square" rtlCol="0">
+            <a:spAutoFit/>
+          </a:bodyPr>
+          <a:lstStyle/>
+          <a:p>
+            <a:r>
+              <a:rPr lang="it-IT" sz="2800" b="1">
+                <a:solidFill>
+                  <a:schemeClr val="tx1">
+                    <a:lumMod val="75000"/>
+                    <a:lumOff val="25000"/>
+                  </a:schemeClr>
+                </a:solidFill>
+                <a:latin typeface="Consolas" panose="020B0609020204030204" pitchFamily="49" charset="0"/>
+              </a:rPr>
+              <a:t>LLM</a:t>
+            </a:r>
+            <a:endParaRPr lang="en-US" sz="2800" b="1">
+              <a:solidFill>
+                <a:schemeClr val="tx1">
+                  <a:lumMod val="75000"/>
+                  <a:lumOff val="25000"/>
+                </a:schemeClr>
+              </a:solidFill>
+              <a:latin typeface="Consolas" panose="020B0609020204030204" pitchFamily="49" charset="0"/>
+            </a:endParaRPr>
+          </a:p>
+        </p:txBody>
+      </p:sp>
+      <p:pic>
+        <p:nvPicPr>
+          <p:cNvPr id="16" name="Picture 6" descr="Azure Search : installation et configuration ! | Le blog de Cellenza">
+            <a:extLst>
+              <a:ext uri="{FF2B5EF4-FFF2-40B4-BE49-F238E27FC236}">
+                <a16:creationId xmlns:a16="http://schemas.microsoft.com/office/drawing/2014/main" id="{A70D7932-0325-09D1-929A-447EC45B1863}"/>
+              </a:ext>
+            </a:extLst>
+          </p:cNvPr>
+          <p:cNvPicPr>
+            <a:picLocks noChangeAspect="1" noChangeArrowheads="1"/>
+          </p:cNvPicPr>
+          <p:nvPr/>
+        </p:nvPicPr>
+        <p:blipFill>
+          <a:blip r:embed="rId5">
+            <a:extLst>
+              <a:ext uri="{28A0092B-C50C-407E-A947-70E740481C1C}">
+                <a14:useLocalDpi xmlns:a14="http://schemas.microsoft.com/office/drawing/2010/main" val="0"/>
+              </a:ext>
+            </a:extLst>
+          </a:blip>
+          <a:srcRect/>
+          <a:stretch>
+            <a:fillRect/>
+          </a:stretch>
+        </p:blipFill>
+        <p:spPr bwMode="auto">
+          <a:xfrm>
+            <a:off x="5984037" y="2677982"/>
+            <a:ext cx="1077712" cy="1077712"/>
+          </a:xfrm>
+          <a:prstGeom prst="rect">
+            <a:avLst/>
+          </a:prstGeom>
+          <a:noFill/>
+          <a:extLst>
+            <a:ext uri="{909E8E84-426E-40DD-AFC4-6F175D3DCCD1}">
+              <a14:hiddenFill xmlns:a14="http://schemas.microsoft.com/office/drawing/2010/main">
+                <a:solidFill>
+                  <a:srgbClr val="FFFFFF"/>
+                </a:solidFill>
+              </a14:hiddenFill>
+            </a:ext>
+          </a:extLst>
+        </p:spPr>
+      </p:pic>
+      <p:sp>
+        <p:nvSpPr>
+          <p:cNvPr id="17" name="Arco 16">
+            <a:extLst>
+              <a:ext uri="{FF2B5EF4-FFF2-40B4-BE49-F238E27FC236}">
+                <a16:creationId xmlns:a16="http://schemas.microsoft.com/office/drawing/2014/main" id="{5CF34A94-4BD1-EFEB-11A3-483567ADBB44}"/>
+              </a:ext>
+            </a:extLst>
+          </p:cNvPr>
+          <p:cNvSpPr/>
+          <p:nvPr/>
+        </p:nvSpPr>
+        <p:spPr>
+          <a:xfrm>
+            <a:off x="3550358" y="3975959"/>
+            <a:ext cx="761763" cy="761763"/>
+          </a:xfrm>
+          <a:prstGeom prst="arc">
+            <a:avLst>
+              <a:gd name="adj1" fmla="val 18032190"/>
+              <a:gd name="adj2" fmla="val 14403248"/>
+            </a:avLst>
+          </a:prstGeom>
+          <a:ln>
+            <a:solidFill>
+              <a:schemeClr val="accent2">
+                <a:lumMod val="75000"/>
+              </a:schemeClr>
+            </a:solidFill>
+            <a:headEnd type="none" w="med" len="med"/>
+            <a:tailEnd type="triangle" w="med" len="med"/>
+          </a:ln>
+        </p:spPr>
+        <p:style>
+          <a:lnRef idx="2">
+            <a:schemeClr val="dk1"/>
+          </a:lnRef>
+          <a:fillRef idx="0">
+            <a:schemeClr val="dk1"/>
+          </a:fillRef>
+          <a:effectRef idx="1">
+            <a:schemeClr val="dk1"/>
+          </a:effectRef>
+          <a:fontRef idx="minor">
+            <a:schemeClr val="tx1"/>
+          </a:fontRef>
+        </p:style>
+        <p:txBody>
+          <a:bodyPr rtlCol="0" anchor="ctr"/>
+          <a:lstStyle/>
+          <a:p>
+            <a:pPr algn="ctr"/>
+            <a:endParaRPr lang="en-US"/>
+          </a:p>
+        </p:txBody>
+      </p:sp>
+      <p:cxnSp>
+        <p:nvCxnSpPr>
+          <p:cNvPr id="18" name="Connettore 2 17">
+            <a:extLst>
+              <a:ext uri="{FF2B5EF4-FFF2-40B4-BE49-F238E27FC236}">
+                <a16:creationId xmlns:a16="http://schemas.microsoft.com/office/drawing/2014/main" id="{F11F935C-ACDC-58AB-4DDB-FA39ED73738E}"/>
+              </a:ext>
+            </a:extLst>
+          </p:cNvPr>
+          <p:cNvCxnSpPr>
+            <a:cxnSpLocks/>
+          </p:cNvCxnSpPr>
+          <p:nvPr/>
+        </p:nvCxnSpPr>
+        <p:spPr>
+          <a:xfrm>
+            <a:off x="4511732" y="3289570"/>
+            <a:ext cx="1305412" cy="0"/>
+          </a:xfrm>
+          <a:prstGeom prst="straightConnector1">
+            <a:avLst/>
+          </a:prstGeom>
+          <a:ln>
+            <a:tailEnd type="triangle"/>
+          </a:ln>
+        </p:spPr>
+        <p:style>
+          <a:lnRef idx="2">
+            <a:schemeClr val="dk1"/>
+          </a:lnRef>
+          <a:fillRef idx="0">
+            <a:schemeClr val="dk1"/>
+          </a:fillRef>
+          <a:effectRef idx="1">
+            <a:schemeClr val="dk1"/>
+          </a:effectRef>
+          <a:fontRef idx="minor">
+            <a:schemeClr val="tx1"/>
+          </a:fontRef>
+        </p:style>
+      </p:cxnSp>
+      <p:cxnSp>
+        <p:nvCxnSpPr>
+          <p:cNvPr id="19" name="Connettore 2 18">
+            <a:extLst>
+              <a:ext uri="{FF2B5EF4-FFF2-40B4-BE49-F238E27FC236}">
+                <a16:creationId xmlns:a16="http://schemas.microsoft.com/office/drawing/2014/main" id="{D5DB7629-2014-A451-0CF1-702CE344BD0D}"/>
+              </a:ext>
+            </a:extLst>
+          </p:cNvPr>
+          <p:cNvCxnSpPr>
+            <a:cxnSpLocks/>
+          </p:cNvCxnSpPr>
+          <p:nvPr/>
+        </p:nvCxnSpPr>
+        <p:spPr>
+          <a:xfrm>
+            <a:off x="7172531" y="3297676"/>
+            <a:ext cx="1251626" cy="0"/>
+          </a:xfrm>
+          <a:prstGeom prst="straightConnector1">
+            <a:avLst/>
+          </a:prstGeom>
+          <a:ln>
+            <a:tailEnd type="triangle"/>
+          </a:ln>
+        </p:spPr>
+        <p:style>
+          <a:lnRef idx="2">
+            <a:schemeClr val="dk1"/>
+          </a:lnRef>
+          <a:fillRef idx="0">
+            <a:schemeClr val="dk1"/>
+          </a:fillRef>
+          <a:effectRef idx="1">
+            <a:schemeClr val="dk1"/>
+          </a:effectRef>
+          <a:fontRef idx="minor">
+            <a:schemeClr val="tx1"/>
+          </a:fontRef>
+        </p:style>
+      </p:cxnSp>
+      <p:cxnSp>
+        <p:nvCxnSpPr>
+          <p:cNvPr id="20" name="Connettore 2 19">
+            <a:extLst>
+              <a:ext uri="{FF2B5EF4-FFF2-40B4-BE49-F238E27FC236}">
+                <a16:creationId xmlns:a16="http://schemas.microsoft.com/office/drawing/2014/main" id="{F7D76F6C-831D-95E9-6A55-2D2E4DA213F2}"/>
+              </a:ext>
+            </a:extLst>
+          </p:cNvPr>
+          <p:cNvCxnSpPr>
+            <a:cxnSpLocks/>
+          </p:cNvCxnSpPr>
+          <p:nvPr/>
+        </p:nvCxnSpPr>
+        <p:spPr>
+          <a:xfrm>
+            <a:off x="9894557" y="3301729"/>
+            <a:ext cx="1493293" cy="0"/>
+          </a:xfrm>
+          <a:prstGeom prst="straightConnector1">
+            <a:avLst/>
+          </a:prstGeom>
+          <a:ln>
+            <a:tailEnd type="triangle"/>
+          </a:ln>
+        </p:spPr>
+        <p:style>
+          <a:lnRef idx="2">
+            <a:schemeClr val="dk1"/>
+          </a:lnRef>
+          <a:fillRef idx="0">
+            <a:schemeClr val="dk1"/>
+          </a:fillRef>
+          <a:effectRef idx="1">
+            <a:schemeClr val="dk1"/>
+          </a:effectRef>
+          <a:fontRef idx="minor">
+            <a:schemeClr val="tx1"/>
+          </a:fontRef>
+        </p:style>
+      </p:cxnSp>
+      <p:pic>
+        <p:nvPicPr>
+          <p:cNvPr id="1030" name="Picture 6" descr="Mail, envelope, message, communication, social media, e-mail, letter ...">
+            <a:extLst>
+              <a:ext uri="{FF2B5EF4-FFF2-40B4-BE49-F238E27FC236}">
+                <a16:creationId xmlns:a16="http://schemas.microsoft.com/office/drawing/2014/main" id="{A52064E7-62E8-CB02-495A-300A15DC21DB}"/>
+              </a:ext>
+            </a:extLst>
+          </p:cNvPr>
+          <p:cNvPicPr>
+            <a:picLocks noChangeAspect="1" noChangeArrowheads="1"/>
+          </p:cNvPicPr>
+          <p:nvPr/>
+        </p:nvPicPr>
+        <p:blipFill>
+          <a:blip r:embed="rId6">
+            <a:extLst>
+              <a:ext uri="{28A0092B-C50C-407E-A947-70E740481C1C}">
+                <a14:useLocalDpi xmlns:a14="http://schemas.microsoft.com/office/drawing/2010/main" val="0"/>
+              </a:ext>
+            </a:extLst>
+          </a:blip>
+          <a:srcRect/>
+          <a:stretch>
+            <a:fillRect/>
+          </a:stretch>
+        </p:blipFill>
+        <p:spPr bwMode="auto">
+          <a:xfrm>
+            <a:off x="2009007" y="2433233"/>
+            <a:ext cx="593260" cy="593260"/>
+          </a:xfrm>
+          <a:prstGeom prst="rect">
+            <a:avLst/>
+          </a:prstGeom>
+          <a:noFill/>
+          <a:extLst>
+            <a:ext uri="{909E8E84-426E-40DD-AFC4-6F175D3DCCD1}">
+              <a14:hiddenFill xmlns:a14="http://schemas.microsoft.com/office/drawing/2010/main">
+                <a:solidFill>
+                  <a:srgbClr val="FFFFFF"/>
+                </a:solidFill>
+              </a14:hiddenFill>
+            </a:ext>
+          </a:extLst>
+        </p:spPr>
+      </p:pic>
+      <p:sp>
+        <p:nvSpPr>
+          <p:cNvPr id="28" name="CasellaDiTesto 27">
+            <a:extLst>
+              <a:ext uri="{FF2B5EF4-FFF2-40B4-BE49-F238E27FC236}">
+                <a16:creationId xmlns:a16="http://schemas.microsoft.com/office/drawing/2014/main" id="{4E9FBAC6-BBE8-F8AF-66D0-4743DC158EA7}"/>
+              </a:ext>
+            </a:extLst>
+          </p:cNvPr>
+          <p:cNvSpPr txBox="1"/>
+          <p:nvPr/>
+        </p:nvSpPr>
+        <p:spPr>
+          <a:xfrm>
+            <a:off x="2932293" y="4782537"/>
+            <a:ext cx="1997892" cy="646331"/>
+          </a:xfrm>
+          <a:prstGeom prst="rect">
+            <a:avLst/>
+          </a:prstGeom>
+          <a:noFill/>
+        </p:spPr>
+        <p:txBody>
+          <a:bodyPr wrap="square" rtlCol="0">
+            <a:spAutoFit/>
+          </a:bodyPr>
+          <a:lstStyle/>
+          <a:p>
+            <a:pPr algn="ctr"/>
+            <a:r>
+              <a:rPr lang="it-IT">
+                <a:solidFill>
+                  <a:schemeClr val="accent2">
+                    <a:lumMod val="75000"/>
+                  </a:schemeClr>
+                </a:solidFill>
+                <a:latin typeface="Consolas" panose="020B0609020204030204" pitchFamily="49" charset="0"/>
+              </a:rPr>
+              <a:t>INTENT IDENTIFICATION</a:t>
+            </a:r>
+            <a:endParaRPr lang="en-US">
+              <a:solidFill>
+                <a:schemeClr val="accent2">
+                  <a:lumMod val="75000"/>
+                </a:schemeClr>
+              </a:solidFill>
+              <a:latin typeface="Consolas" panose="020B0609020204030204" pitchFamily="49" charset="0"/>
+            </a:endParaRPr>
+          </a:p>
+        </p:txBody>
+      </p:sp>
+      <p:sp>
+        <p:nvSpPr>
+          <p:cNvPr id="31" name="Arco 30">
+            <a:extLst>
+              <a:ext uri="{FF2B5EF4-FFF2-40B4-BE49-F238E27FC236}">
+                <a16:creationId xmlns:a16="http://schemas.microsoft.com/office/drawing/2014/main" id="{7F9F16B4-DC8B-03DB-3909-1B5B1303C9E8}"/>
+              </a:ext>
+            </a:extLst>
+          </p:cNvPr>
+          <p:cNvSpPr/>
+          <p:nvPr/>
+        </p:nvSpPr>
+        <p:spPr>
+          <a:xfrm>
+            <a:off x="8980300" y="3975959"/>
+            <a:ext cx="761763" cy="761763"/>
+          </a:xfrm>
+          <a:prstGeom prst="arc">
+            <a:avLst>
+              <a:gd name="adj1" fmla="val 18032190"/>
+              <a:gd name="adj2" fmla="val 14403248"/>
+            </a:avLst>
+          </a:prstGeom>
+          <a:ln>
+            <a:solidFill>
+              <a:schemeClr val="accent2">
+                <a:lumMod val="75000"/>
+              </a:schemeClr>
+            </a:solidFill>
+            <a:headEnd type="none" w="med" len="med"/>
+            <a:tailEnd type="triangle" w="med" len="med"/>
+          </a:ln>
+        </p:spPr>
+        <p:style>
+          <a:lnRef idx="2">
+            <a:schemeClr val="dk1"/>
+          </a:lnRef>
+          <a:fillRef idx="0">
+            <a:schemeClr val="dk1"/>
+          </a:fillRef>
+          <a:effectRef idx="1">
+            <a:schemeClr val="dk1"/>
+          </a:effectRef>
+          <a:fontRef idx="minor">
+            <a:schemeClr val="tx1"/>
+          </a:fontRef>
+        </p:style>
+        <p:txBody>
+          <a:bodyPr rtlCol="0" anchor="ctr"/>
+          <a:lstStyle/>
+          <a:p>
+            <a:pPr algn="ctr"/>
+            <a:endParaRPr lang="en-US"/>
+          </a:p>
+        </p:txBody>
+      </p:sp>
+      <p:sp>
+        <p:nvSpPr>
+          <p:cNvPr id="32" name="CasellaDiTesto 31">
+            <a:extLst>
+              <a:ext uri="{FF2B5EF4-FFF2-40B4-BE49-F238E27FC236}">
+                <a16:creationId xmlns:a16="http://schemas.microsoft.com/office/drawing/2014/main" id="{5CC48AED-897B-9BBF-5E75-EAA3B9543648}"/>
+              </a:ext>
+            </a:extLst>
+          </p:cNvPr>
+          <p:cNvSpPr txBox="1"/>
+          <p:nvPr/>
+        </p:nvSpPr>
+        <p:spPr>
+          <a:xfrm>
+            <a:off x="6987632" y="4782537"/>
+            <a:ext cx="4747097" cy="646331"/>
+          </a:xfrm>
+          <a:prstGeom prst="rect">
+            <a:avLst/>
+          </a:prstGeom>
+          <a:noFill/>
+        </p:spPr>
+        <p:txBody>
+          <a:bodyPr wrap="square" rtlCol="0">
+            <a:spAutoFit/>
+          </a:bodyPr>
+          <a:lstStyle/>
+          <a:p>
+            <a:pPr algn="ctr"/>
+            <a:r>
+              <a:rPr lang="it-IT">
+                <a:solidFill>
+                  <a:schemeClr val="accent2">
+                    <a:lumMod val="75000"/>
+                  </a:schemeClr>
+                </a:solidFill>
+                <a:latin typeface="Consolas" panose="020B0609020204030204" pitchFamily="49" charset="0"/>
+              </a:rPr>
+              <a:t>RESPONSE GENERATION </a:t>
+            </a:r>
+          </a:p>
+          <a:p>
+            <a:pPr algn="ctr"/>
+            <a:r>
+              <a:rPr lang="it-IT">
+                <a:solidFill>
+                  <a:schemeClr val="accent2">
+                    <a:lumMod val="75000"/>
+                  </a:schemeClr>
+                </a:solidFill>
+                <a:latin typeface="Consolas" panose="020B0609020204030204" pitchFamily="49" charset="0"/>
+              </a:rPr>
+              <a:t>(BASED ON QUERY AND RETRIVED DOCS)</a:t>
+            </a:r>
+            <a:endParaRPr lang="en-US">
+              <a:solidFill>
+                <a:schemeClr val="accent2">
+                  <a:lumMod val="75000"/>
+                </a:schemeClr>
+              </a:solidFill>
+              <a:latin typeface="Consolas" panose="020B0609020204030204" pitchFamily="49" charset="0"/>
+            </a:endParaRPr>
+          </a:p>
+        </p:txBody>
+      </p:sp>
+      <p:pic>
+        <p:nvPicPr>
+          <p:cNvPr id="33" name="Picture 6" descr="Mail, envelope, message, communication, social media, e-mail, letter ...">
+            <a:extLst>
+              <a:ext uri="{FF2B5EF4-FFF2-40B4-BE49-F238E27FC236}">
+                <a16:creationId xmlns:a16="http://schemas.microsoft.com/office/drawing/2014/main" id="{C7853813-BAEE-EAB7-73D9-063D20BE5203}"/>
+              </a:ext>
+            </a:extLst>
+          </p:cNvPr>
+          <p:cNvPicPr>
+            <a:picLocks noChangeAspect="1" noChangeArrowheads="1"/>
+          </p:cNvPicPr>
+          <p:nvPr/>
+        </p:nvPicPr>
+        <p:blipFill>
+          <a:blip r:embed="rId6">
+            <a:extLst>
+              <a:ext uri="{28A0092B-C50C-407E-A947-70E740481C1C}">
+                <a14:useLocalDpi xmlns:a14="http://schemas.microsoft.com/office/drawing/2010/main" val="0"/>
+              </a:ext>
+            </a:extLst>
+          </a:blip>
+          <a:srcRect/>
+          <a:stretch>
+            <a:fillRect/>
+          </a:stretch>
+        </p:blipFill>
+        <p:spPr bwMode="auto">
+          <a:xfrm>
+            <a:off x="4897578" y="2433233"/>
+            <a:ext cx="593260" cy="593260"/>
+          </a:xfrm>
+          <a:prstGeom prst="rect">
+            <a:avLst/>
+          </a:prstGeom>
+          <a:noFill/>
+          <a:extLst>
+            <a:ext uri="{909E8E84-426E-40DD-AFC4-6F175D3DCCD1}">
+              <a14:hiddenFill xmlns:a14="http://schemas.microsoft.com/office/drawing/2010/main">
+                <a:solidFill>
+                  <a:srgbClr val="FFFFFF"/>
+                </a:solidFill>
+              </a14:hiddenFill>
+            </a:ext>
+          </a:extLst>
+        </p:spPr>
+      </p:pic>
+      <p:pic>
+        <p:nvPicPr>
+          <p:cNvPr id="34" name="Picture 6" descr="Mail, envelope, message, communication, social media, e-mail, letter ...">
+            <a:extLst>
+              <a:ext uri="{FF2B5EF4-FFF2-40B4-BE49-F238E27FC236}">
+                <a16:creationId xmlns:a16="http://schemas.microsoft.com/office/drawing/2014/main" id="{3A8862A2-B225-733C-A159-E1B21CC5F6A2}"/>
+              </a:ext>
+            </a:extLst>
+          </p:cNvPr>
+          <p:cNvPicPr>
+            <a:picLocks noChangeAspect="1" noChangeArrowheads="1"/>
+          </p:cNvPicPr>
+          <p:nvPr/>
+        </p:nvPicPr>
+        <p:blipFill>
+          <a:blip r:embed="rId6">
+            <a:extLst>
+              <a:ext uri="{28A0092B-C50C-407E-A947-70E740481C1C}">
+                <a14:useLocalDpi xmlns:a14="http://schemas.microsoft.com/office/drawing/2010/main" val="0"/>
+              </a:ext>
+            </a:extLst>
+          </a:blip>
+          <a:srcRect/>
+          <a:stretch>
+            <a:fillRect/>
+          </a:stretch>
+        </p:blipFill>
+        <p:spPr bwMode="auto">
+          <a:xfrm>
+            <a:off x="7472116" y="2433233"/>
+            <a:ext cx="593260" cy="593260"/>
+          </a:xfrm>
+          <a:prstGeom prst="rect">
+            <a:avLst/>
+          </a:prstGeom>
+          <a:noFill/>
+          <a:extLst>
+            <a:ext uri="{909E8E84-426E-40DD-AFC4-6F175D3DCCD1}">
+              <a14:hiddenFill xmlns:a14="http://schemas.microsoft.com/office/drawing/2010/main">
+                <a:solidFill>
+                  <a:srgbClr val="FFFFFF"/>
+                </a:solidFill>
+              </a14:hiddenFill>
+            </a:ext>
+          </a:extLst>
+        </p:spPr>
+      </p:pic>
+      <p:pic>
+        <p:nvPicPr>
+          <p:cNvPr id="35" name="Picture 6" descr="Mail, envelope, message, communication, social media, e-mail, letter ...">
+            <a:extLst>
+              <a:ext uri="{FF2B5EF4-FFF2-40B4-BE49-F238E27FC236}">
+                <a16:creationId xmlns:a16="http://schemas.microsoft.com/office/drawing/2014/main" id="{2B58D49D-A3FC-D8DE-2FA6-5BACDA29689C}"/>
+              </a:ext>
+            </a:extLst>
+          </p:cNvPr>
+          <p:cNvPicPr>
+            <a:picLocks noChangeAspect="1" noChangeArrowheads="1"/>
+          </p:cNvPicPr>
+          <p:nvPr/>
+        </p:nvPicPr>
+        <p:blipFill>
+          <a:blip r:embed="rId6">
+            <a:extLst>
+              <a:ext uri="{28A0092B-C50C-407E-A947-70E740481C1C}">
+                <a14:useLocalDpi xmlns:a14="http://schemas.microsoft.com/office/drawing/2010/main" val="0"/>
+              </a:ext>
+            </a:extLst>
+          </a:blip>
+          <a:srcRect/>
+          <a:stretch>
+            <a:fillRect/>
+          </a:stretch>
+        </p:blipFill>
+        <p:spPr bwMode="auto">
+          <a:xfrm>
+            <a:off x="10422049" y="2433233"/>
+            <a:ext cx="593260" cy="593260"/>
+          </a:xfrm>
+          <a:prstGeom prst="rect">
+            <a:avLst/>
+          </a:prstGeom>
+          <a:noFill/>
+          <a:extLst>
+            <a:ext uri="{909E8E84-426E-40DD-AFC4-6F175D3DCCD1}">
+              <a14:hiddenFill xmlns:a14="http://schemas.microsoft.com/office/drawing/2010/main">
+                <a:solidFill>
+                  <a:srgbClr val="FFFFFF"/>
+                </a:solidFill>
+              </a14:hiddenFill>
+            </a:ext>
+          </a:extLst>
+        </p:spPr>
+      </p:pic>
+      <p:sp>
+        <p:nvSpPr>
+          <p:cNvPr id="37" name="CasellaDiTesto 36">
+            <a:extLst>
+              <a:ext uri="{FF2B5EF4-FFF2-40B4-BE49-F238E27FC236}">
+                <a16:creationId xmlns:a16="http://schemas.microsoft.com/office/drawing/2014/main" id="{476C9FD0-B15A-EAF7-D25A-B9BB4F6EF9E3}"/>
+              </a:ext>
+            </a:extLst>
+          </p:cNvPr>
+          <p:cNvSpPr txBox="1"/>
+          <p:nvPr/>
+        </p:nvSpPr>
+        <p:spPr>
+          <a:xfrm>
+            <a:off x="1938192" y="2155565"/>
+            <a:ext cx="817123" cy="338554"/>
+          </a:xfrm>
+          <a:prstGeom prst="rect">
+            <a:avLst/>
+          </a:prstGeom>
+          <a:noFill/>
+        </p:spPr>
+        <p:txBody>
+          <a:bodyPr wrap="square" rtlCol="0">
+            <a:spAutoFit/>
+          </a:bodyPr>
+          <a:lstStyle/>
+          <a:p>
+            <a:r>
+              <a:rPr lang="it-IT" sz="1600" b="1">
+                <a:solidFill>
+                  <a:srgbClr val="BA8212"/>
+                </a:solidFill>
+                <a:latin typeface="Consolas" panose="020B0609020204030204" pitchFamily="49" charset="0"/>
+              </a:rPr>
+              <a:t>QUERY</a:t>
+            </a:r>
+            <a:endParaRPr lang="en-US" sz="1600" b="1">
+              <a:solidFill>
+                <a:srgbClr val="BA8212"/>
+              </a:solidFill>
+              <a:latin typeface="Consolas" panose="020B0609020204030204" pitchFamily="49" charset="0"/>
+            </a:endParaRPr>
+          </a:p>
+        </p:txBody>
+      </p:sp>
+      <p:sp>
+        <p:nvSpPr>
+          <p:cNvPr id="38" name="CasellaDiTesto 37">
+            <a:extLst>
+              <a:ext uri="{FF2B5EF4-FFF2-40B4-BE49-F238E27FC236}">
+                <a16:creationId xmlns:a16="http://schemas.microsoft.com/office/drawing/2014/main" id="{64AB1295-090D-853E-60DF-ACA009B39B7F}"/>
+              </a:ext>
+            </a:extLst>
+          </p:cNvPr>
+          <p:cNvSpPr txBox="1"/>
+          <p:nvPr/>
+        </p:nvSpPr>
+        <p:spPr>
+          <a:xfrm>
+            <a:off x="4804210" y="1918951"/>
+            <a:ext cx="1569758" cy="584775"/>
+          </a:xfrm>
+          <a:prstGeom prst="rect">
+            <a:avLst/>
+          </a:prstGeom>
+          <a:noFill/>
+        </p:spPr>
+        <p:txBody>
+          <a:bodyPr wrap="square" rtlCol="0">
+            <a:spAutoFit/>
+          </a:bodyPr>
+          <a:lstStyle/>
+          <a:p>
+            <a:r>
+              <a:rPr lang="it-IT" sz="1600" b="1">
+                <a:solidFill>
+                  <a:srgbClr val="BA8212"/>
+                </a:solidFill>
+                <a:latin typeface="Consolas" panose="020B0609020204030204" pitchFamily="49" charset="0"/>
+              </a:rPr>
+              <a:t>OPTIMIZED QUERY</a:t>
+            </a:r>
+            <a:endParaRPr lang="en-US" sz="1600" b="1">
+              <a:solidFill>
+                <a:srgbClr val="BA8212"/>
+              </a:solidFill>
+              <a:latin typeface="Consolas" panose="020B0609020204030204" pitchFamily="49" charset="0"/>
+            </a:endParaRPr>
+          </a:p>
+        </p:txBody>
+      </p:sp>
+      <p:sp>
+        <p:nvSpPr>
+          <p:cNvPr id="39" name="CasellaDiTesto 38">
+            <a:extLst>
+              <a:ext uri="{FF2B5EF4-FFF2-40B4-BE49-F238E27FC236}">
+                <a16:creationId xmlns:a16="http://schemas.microsoft.com/office/drawing/2014/main" id="{CD9E8965-1D5E-2EEB-A1D0-07F6035AB72D}"/>
+              </a:ext>
+            </a:extLst>
+          </p:cNvPr>
+          <p:cNvSpPr txBox="1"/>
+          <p:nvPr/>
+        </p:nvSpPr>
+        <p:spPr>
+          <a:xfrm>
+            <a:off x="10323087" y="2155565"/>
+            <a:ext cx="1129611" cy="338554"/>
+          </a:xfrm>
+          <a:prstGeom prst="rect">
+            <a:avLst/>
+          </a:prstGeom>
+          <a:noFill/>
+        </p:spPr>
+        <p:txBody>
+          <a:bodyPr wrap="square" rtlCol="0">
+            <a:spAutoFit/>
+          </a:bodyPr>
+          <a:lstStyle/>
+          <a:p>
+            <a:r>
+              <a:rPr lang="it-IT" sz="1600" b="1">
+                <a:solidFill>
+                  <a:srgbClr val="BA8212"/>
+                </a:solidFill>
+                <a:latin typeface="Consolas" panose="020B0609020204030204" pitchFamily="49" charset="0"/>
+              </a:rPr>
+              <a:t>RESPONSE</a:t>
+            </a:r>
+            <a:endParaRPr lang="en-US" sz="1600" b="1">
+              <a:solidFill>
+                <a:srgbClr val="BA8212"/>
+              </a:solidFill>
+              <a:latin typeface="Consolas" panose="020B0609020204030204" pitchFamily="49" charset="0"/>
+            </a:endParaRPr>
+          </a:p>
+        </p:txBody>
+      </p:sp>
+      <p:sp>
+        <p:nvSpPr>
+          <p:cNvPr id="40" name="CasellaDiTesto 39">
+            <a:extLst>
+              <a:ext uri="{FF2B5EF4-FFF2-40B4-BE49-F238E27FC236}">
+                <a16:creationId xmlns:a16="http://schemas.microsoft.com/office/drawing/2014/main" id="{6305D162-5E33-78DF-E717-DEA0D1EA7C1E}"/>
+              </a:ext>
+            </a:extLst>
+          </p:cNvPr>
+          <p:cNvSpPr txBox="1"/>
+          <p:nvPr/>
+        </p:nvSpPr>
+        <p:spPr>
+          <a:xfrm>
+            <a:off x="5817144" y="3560324"/>
+            <a:ext cx="2199705" cy="400110"/>
+          </a:xfrm>
+          <a:prstGeom prst="rect">
+            <a:avLst/>
+          </a:prstGeom>
+          <a:noFill/>
+        </p:spPr>
+        <p:txBody>
+          <a:bodyPr wrap="square" rtlCol="0">
+            <a:spAutoFit/>
+          </a:bodyPr>
+          <a:lstStyle/>
+          <a:p>
+            <a:r>
+              <a:rPr lang="it-IT" sz="2000" b="1">
+                <a:solidFill>
+                  <a:srgbClr val="0079D6"/>
+                </a:solidFill>
+                <a:latin typeface="Consolas" panose="020B0609020204030204" pitchFamily="49" charset="0"/>
+              </a:rPr>
+              <a:t>AI SEARCH</a:t>
+            </a:r>
+            <a:endParaRPr lang="en-US" sz="2000" b="1">
+              <a:solidFill>
+                <a:srgbClr val="0079D6"/>
+              </a:solidFill>
+              <a:latin typeface="Consolas" panose="020B0609020204030204" pitchFamily="49" charset="0"/>
+            </a:endParaRPr>
+          </a:p>
+        </p:txBody>
+      </p:sp>
+      <p:sp>
+        <p:nvSpPr>
+          <p:cNvPr id="41" name="CasellaDiTesto 40">
+            <a:extLst>
+              <a:ext uri="{FF2B5EF4-FFF2-40B4-BE49-F238E27FC236}">
+                <a16:creationId xmlns:a16="http://schemas.microsoft.com/office/drawing/2014/main" id="{6756B338-AA27-F8E6-4B89-E45238962618}"/>
+              </a:ext>
+            </a:extLst>
+          </p:cNvPr>
+          <p:cNvSpPr txBox="1"/>
+          <p:nvPr/>
+        </p:nvSpPr>
+        <p:spPr>
+          <a:xfrm>
+            <a:off x="7361672" y="2157533"/>
+            <a:ext cx="1569758" cy="338554"/>
+          </a:xfrm>
+          <a:prstGeom prst="rect">
+            <a:avLst/>
+          </a:prstGeom>
+          <a:noFill/>
+        </p:spPr>
+        <p:txBody>
+          <a:bodyPr wrap="square" rtlCol="0">
+            <a:spAutoFit/>
+          </a:bodyPr>
+          <a:lstStyle/>
+          <a:p>
+            <a:r>
+              <a:rPr lang="it-IT" sz="1600" b="1">
+                <a:solidFill>
+                  <a:srgbClr val="BA8212"/>
+                </a:solidFill>
+                <a:latin typeface="Consolas" panose="020B0609020204030204" pitchFamily="49" charset="0"/>
+              </a:rPr>
+              <a:t>TOP DOCS</a:t>
+            </a:r>
+            <a:endParaRPr lang="en-US" sz="1600" b="1">
+              <a:solidFill>
+                <a:srgbClr val="BA8212"/>
+              </a:solidFill>
+              <a:latin typeface="Consolas" panose="020B0609020204030204" pitchFamily="49" charset="0"/>
+            </a:endParaRPr>
+          </a:p>
+        </p:txBody>
+      </p:sp>
     </p:spTree>
     <p:extLst>
       <p:ext uri="{BB962C8B-B14F-4D97-AF65-F5344CB8AC3E}">
-        <p14:creationId xmlns:p14="http://schemas.microsoft.com/office/powerpoint/2010/main" val="3632324700"/>
+        <p14:creationId xmlns:p14="http://schemas.microsoft.com/office/powerpoint/2010/main" val="786728020"/>
       </p:ext>
     </p:extLst>
   </p:cSld>
@@ -9121,7 +9671,7 @@
 </p:sld>
 </file>
 
-<file path=ppt/slides/slide2.xml><?xml version="1.0" encoding="utf-8"?>
+<file path=ppt/slides/slide3.xml><?xml version="1.0" encoding="utf-8"?>
 <p:sld xmlns:a="http://schemas.openxmlformats.org/drawingml/2006/main" xmlns:r="http://schemas.openxmlformats.org/officeDocument/2006/relationships" xmlns:p="http://schemas.openxmlformats.org/presentationml/2006/main">
   <p:cSld>
     <p:bg>
@@ -10082,7 +10632,7 @@
 </p:sld>
 </file>
 
-<file path=ppt/slides/slide3.xml><?xml version="1.0" encoding="utf-8"?>
+<file path=ppt/slides/slide4.xml><?xml version="1.0" encoding="utf-8"?>
 <p:sld xmlns:a="http://schemas.openxmlformats.org/drawingml/2006/main" xmlns:r="http://schemas.openxmlformats.org/officeDocument/2006/relationships" xmlns:p="http://schemas.openxmlformats.org/presentationml/2006/main">
   <p:cSld>
     <p:bg>
@@ -10229,7 +10779,7 @@
 </p:sld>
 </file>
 
-<file path=ppt/slides/slide4.xml><?xml version="1.0" encoding="utf-8"?>
+<file path=ppt/slides/slide5.xml><?xml version="1.0" encoding="utf-8"?>
 <p:sld xmlns:a="http://schemas.openxmlformats.org/drawingml/2006/main" xmlns:r="http://schemas.openxmlformats.org/officeDocument/2006/relationships" xmlns:p="http://schemas.openxmlformats.org/presentationml/2006/main">
   <p:cSld>
     <p:bg>
@@ -10775,7 +11325,7 @@
 </p:sld>
 </file>
 
-<file path=ppt/slides/slide5.xml><?xml version="1.0" encoding="utf-8"?>
+<file path=ppt/slides/slide6.xml><?xml version="1.0" encoding="utf-8"?>
 <p:sld xmlns:a="http://schemas.openxmlformats.org/drawingml/2006/main" xmlns:r="http://schemas.openxmlformats.org/officeDocument/2006/relationships" xmlns:p="http://schemas.openxmlformats.org/presentationml/2006/main">
   <p:cSld>
     <p:bg>
@@ -11709,7 +12259,7 @@
 </p:sld>
 </file>
 
-<file path=ppt/slides/slide6.xml><?xml version="1.0" encoding="utf-8"?>
+<file path=ppt/slides/slide7.xml><?xml version="1.0" encoding="utf-8"?>
 <p:sld xmlns:a="http://schemas.openxmlformats.org/drawingml/2006/main" xmlns:r="http://schemas.openxmlformats.org/officeDocument/2006/relationships" xmlns:p="http://schemas.openxmlformats.org/presentationml/2006/main">
   <p:cSld>
     <p:bg>
@@ -13075,7 +13625,7 @@
 </p:sld>
 </file>
 
-<file path=ppt/slides/slide7.xml><?xml version="1.0" encoding="utf-8"?>
+<file path=ppt/slides/slide8.xml><?xml version="1.0" encoding="utf-8"?>
 <p:sld xmlns:a="http://schemas.openxmlformats.org/drawingml/2006/main" xmlns:r="http://schemas.openxmlformats.org/officeDocument/2006/relationships" xmlns:p="http://schemas.openxmlformats.org/presentationml/2006/main">
   <p:cSld>
     <p:bg>
@@ -14738,7 +15288,7 @@
 </p:sld>
 </file>
 
-<file path=ppt/slides/slide8.xml><?xml version="1.0" encoding="utf-8"?>
+<file path=ppt/slides/slide9.xml><?xml version="1.0" encoding="utf-8"?>
 <p:sld xmlns:a="http://schemas.openxmlformats.org/drawingml/2006/main" xmlns:r="http://schemas.openxmlformats.org/officeDocument/2006/relationships" xmlns:p="http://schemas.openxmlformats.org/presentationml/2006/main">
   <p:cSld>
     <p:bg>
@@ -16004,268 +16554,6 @@
     <p:extLst>
       <p:ext uri="{BB962C8B-B14F-4D97-AF65-F5344CB8AC3E}">
         <p14:creationId xmlns:p14="http://schemas.microsoft.com/office/powerpoint/2010/main" val="394213757"/>
-      </p:ext>
-    </p:extLst>
-  </p:cSld>
-  <p:clrMapOvr>
-    <a:masterClrMapping/>
-  </p:clrMapOvr>
-</p:sld>
-</file>
-
-<file path=ppt/slides/slide9.xml><?xml version="1.0" encoding="utf-8"?>
-<p:sld xmlns:a="http://schemas.openxmlformats.org/drawingml/2006/main" xmlns:r="http://schemas.openxmlformats.org/officeDocument/2006/relationships" xmlns:p="http://schemas.openxmlformats.org/presentationml/2006/main">
-  <p:cSld>
-    <p:bg>
-      <p:bgPr>
-        <a:gradFill>
-          <a:gsLst>
-            <a:gs pos="0">
-              <a:srgbClr val="7030A0">
-                <a:alpha val="39000"/>
-              </a:srgbClr>
-            </a:gs>
-            <a:gs pos="100000">
-              <a:schemeClr val="tx2">
-                <a:alpha val="50000"/>
-                <a:lumMod val="60000"/>
-                <a:lumOff val="40000"/>
-              </a:schemeClr>
-            </a:gs>
-          </a:gsLst>
-          <a:path path="circle">
-            <a:fillToRect l="100000" b="100000"/>
-          </a:path>
-        </a:gradFill>
-        <a:effectLst/>
-      </p:bgPr>
-    </p:bg>
-    <p:spTree>
-      <p:nvGrpSpPr>
-        <p:cNvPr id="1" name="">
-          <a:extLst>
-            <a:ext uri="{FF2B5EF4-FFF2-40B4-BE49-F238E27FC236}">
-              <a16:creationId xmlns:a16="http://schemas.microsoft.com/office/drawing/2014/main" id="{6FCB7284-CD00-C82D-8E6B-AD655205B635}"/>
-            </a:ext>
-          </a:extLst>
-        </p:cNvPr>
-        <p:cNvGrpSpPr/>
-        <p:nvPr/>
-      </p:nvGrpSpPr>
-      <p:grpSpPr>
-        <a:xfrm>
-          <a:off x="0" y="0"/>
-          <a:ext cx="0" cy="0"/>
-          <a:chOff x="0" y="0"/>
-          <a:chExt cx="0" cy="0"/>
-        </a:xfrm>
-      </p:grpSpPr>
-      <p:sp>
-        <p:nvSpPr>
-          <p:cNvPr id="12" name="Rettangolo con angoli arrotondati 11">
-            <a:extLst>
-              <a:ext uri="{FF2B5EF4-FFF2-40B4-BE49-F238E27FC236}">
-                <a16:creationId xmlns:a16="http://schemas.microsoft.com/office/drawing/2014/main" id="{6EAEDE85-67AC-C05A-9D25-6A16982C951E}"/>
-              </a:ext>
-            </a:extLst>
-          </p:cNvPr>
-          <p:cNvSpPr/>
-          <p:nvPr/>
-        </p:nvSpPr>
-        <p:spPr>
-          <a:xfrm>
-            <a:off x="585857" y="3973748"/>
-            <a:ext cx="1753388" cy="826215"/>
-          </a:xfrm>
-          <a:prstGeom prst="roundRect">
-            <a:avLst>
-              <a:gd name="adj" fmla="val 18365"/>
-            </a:avLst>
-          </a:prstGeom>
-          <a:solidFill>
-            <a:schemeClr val="bg2"/>
-          </a:solidFill>
-        </p:spPr>
-        <p:style>
-          <a:lnRef idx="2">
-            <a:schemeClr val="accent1">
-              <a:shade val="15000"/>
-            </a:schemeClr>
-          </a:lnRef>
-          <a:fillRef idx="1">
-            <a:schemeClr val="accent1"/>
-          </a:fillRef>
-          <a:effectRef idx="0">
-            <a:schemeClr val="accent1"/>
-          </a:effectRef>
-          <a:fontRef idx="minor">
-            <a:schemeClr val="lt1"/>
-          </a:fontRef>
-        </p:style>
-        <p:txBody>
-          <a:bodyPr rtlCol="0" anchor="ctr"/>
-          <a:lstStyle/>
-          <a:p>
-            <a:pPr algn="ctr"/>
-            <a:endParaRPr lang="en-US"/>
-          </a:p>
-        </p:txBody>
-      </p:sp>
-      <p:sp>
-        <p:nvSpPr>
-          <p:cNvPr id="13" name="CasellaDiTesto 12">
-            <a:extLst>
-              <a:ext uri="{FF2B5EF4-FFF2-40B4-BE49-F238E27FC236}">
-                <a16:creationId xmlns:a16="http://schemas.microsoft.com/office/drawing/2014/main" id="{CDE5D162-B2D0-4FEF-2387-3C19B7C063FD}"/>
-              </a:ext>
-            </a:extLst>
-          </p:cNvPr>
-          <p:cNvSpPr txBox="1"/>
-          <p:nvPr/>
-        </p:nvSpPr>
-        <p:spPr>
-          <a:xfrm>
-            <a:off x="851952" y="4096860"/>
-            <a:ext cx="1213191" cy="584775"/>
-          </a:xfrm>
-          <a:prstGeom prst="rect">
-            <a:avLst/>
-          </a:prstGeom>
-          <a:noFill/>
-        </p:spPr>
-        <p:txBody>
-          <a:bodyPr wrap="square" rtlCol="0">
-            <a:spAutoFit/>
-          </a:bodyPr>
-          <a:lstStyle/>
-          <a:p>
-            <a:r>
-              <a:rPr lang="it-IT" sz="1600" b="1" i="1">
-                <a:latin typeface="Consolas" panose="020B0609020204030204" pitchFamily="49" charset="0"/>
-              </a:rPr>
-              <a:t>Documents retrieved</a:t>
-            </a:r>
-            <a:endParaRPr lang="it-IT" sz="1600">
-              <a:latin typeface="Consolas" panose="020B0609020204030204" pitchFamily="49" charset="0"/>
-            </a:endParaRPr>
-          </a:p>
-        </p:txBody>
-      </p:sp>
-      <p:sp>
-        <p:nvSpPr>
-          <p:cNvPr id="2" name="Rettangolo con angoli arrotondati 1">
-            <a:extLst>
-              <a:ext uri="{FF2B5EF4-FFF2-40B4-BE49-F238E27FC236}">
-                <a16:creationId xmlns:a16="http://schemas.microsoft.com/office/drawing/2014/main" id="{540EB26A-9E19-874F-4F1C-00E4273BD670}"/>
-              </a:ext>
-            </a:extLst>
-          </p:cNvPr>
-          <p:cNvSpPr/>
-          <p:nvPr/>
-        </p:nvSpPr>
-        <p:spPr>
-          <a:xfrm>
-            <a:off x="585857" y="1927855"/>
-            <a:ext cx="1745382" cy="960184"/>
-          </a:xfrm>
-          <a:prstGeom prst="roundRect">
-            <a:avLst/>
-          </a:prstGeom>
-          <a:solidFill>
-            <a:schemeClr val="bg2"/>
-          </a:solidFill>
-        </p:spPr>
-        <p:style>
-          <a:lnRef idx="2">
-            <a:schemeClr val="accent1">
-              <a:shade val="15000"/>
-            </a:schemeClr>
-          </a:lnRef>
-          <a:fillRef idx="1">
-            <a:schemeClr val="accent1"/>
-          </a:fillRef>
-          <a:effectRef idx="0">
-            <a:schemeClr val="accent1"/>
-          </a:effectRef>
-          <a:fontRef idx="minor">
-            <a:schemeClr val="lt1"/>
-          </a:fontRef>
-        </p:style>
-        <p:txBody>
-          <a:bodyPr rtlCol="0" anchor="ctr"/>
-          <a:lstStyle/>
-          <a:p>
-            <a:pPr algn="ctr"/>
-            <a:endParaRPr lang="en-US"/>
-          </a:p>
-        </p:txBody>
-      </p:sp>
-      <p:sp>
-        <p:nvSpPr>
-          <p:cNvPr id="8" name="CasellaDiTesto 7">
-            <a:extLst>
-              <a:ext uri="{FF2B5EF4-FFF2-40B4-BE49-F238E27FC236}">
-                <a16:creationId xmlns:a16="http://schemas.microsoft.com/office/drawing/2014/main" id="{04CA574B-D0A5-2998-CC33-2B94F8726A7F}"/>
-              </a:ext>
-            </a:extLst>
-          </p:cNvPr>
-          <p:cNvSpPr txBox="1"/>
-          <p:nvPr/>
-        </p:nvSpPr>
-        <p:spPr>
-          <a:xfrm>
-            <a:off x="645743" y="1992449"/>
-            <a:ext cx="1693502" cy="830997"/>
-          </a:xfrm>
-          <a:prstGeom prst="rect">
-            <a:avLst/>
-          </a:prstGeom>
-          <a:noFill/>
-        </p:spPr>
-        <p:txBody>
-          <a:bodyPr wrap="square" rtlCol="0">
-            <a:spAutoFit/>
-          </a:bodyPr>
-          <a:lstStyle/>
-          <a:p>
-            <a:pPr algn="ctr"/>
-            <a:r>
-              <a:rPr lang="it-IT" sz="1600" b="1">
-                <a:latin typeface="Consolas" panose="020B0609020204030204" pitchFamily="49" charset="0"/>
-              </a:rPr>
-              <a:t>History</a:t>
-            </a:r>
-            <a:endParaRPr lang="en-US" sz="1600" b="1">
-              <a:latin typeface="Consolas" panose="020B0609020204030204" pitchFamily="49" charset="0"/>
-            </a:endParaRPr>
-          </a:p>
-          <a:p>
-            <a:pPr algn="ctr"/>
-            <a:r>
-              <a:rPr lang="en-US" sz="1600" b="1">
-                <a:latin typeface="Consolas" panose="020B0609020204030204" pitchFamily="49" charset="0"/>
-              </a:rPr>
-              <a:t>+</a:t>
-            </a:r>
-          </a:p>
-          <a:p>
-            <a:pPr algn="ctr"/>
-            <a:r>
-              <a:rPr lang="it-IT" sz="1600" b="1">
-                <a:latin typeface="Consolas" panose="020B0609020204030204" pitchFamily="49" charset="0"/>
-              </a:rPr>
-              <a:t>Query</a:t>
-            </a:r>
-            <a:endParaRPr lang="it-IT" sz="1600">
-              <a:latin typeface="Consolas" panose="020B0609020204030204" pitchFamily="49" charset="0"/>
-            </a:endParaRPr>
-          </a:p>
-        </p:txBody>
-      </p:sp>
-    </p:spTree>
-    <p:extLst>
-      <p:ext uri="{BB962C8B-B14F-4D97-AF65-F5344CB8AC3E}">
-        <p14:creationId xmlns:p14="http://schemas.microsoft.com/office/powerpoint/2010/main" val="8740249"/>
       </p:ext>
     </p:extLst>
   </p:cSld>

</xml_diff>